<commit_message>
[Update] Report and PPTX
</commit_message>
<xml_diff>
--- a/Slide_MPC_Planner.pptx
+++ b/Slide_MPC_Planner.pptx
@@ -145,8 +145,8 @@
 <file path=ppt/revisionInfo.xml><?xml version="1.0" encoding="utf-8"?>
 <p1510:revInfo xmlns:a="http://schemas.openxmlformats.org/drawingml/2006/main" xmlns:r="http://schemas.openxmlformats.org/officeDocument/2006/relationships" xmlns:p1510="http://schemas.microsoft.com/office/powerpoint/2015/10/main">
   <p1510:revLst>
+    <p1510:client id="{CF1C3FAD-796D-CC85-63C9-D65333FB8607}" v="324" dt="2021-06-10T02:30:56.153"/>
     <p1510:client id="{E3E26AFD-7F6B-9EE3-22C7-1AA86C2B3D9E}" v="76" dt="2021-06-10T02:19:20.529"/>
-    <p1510:client id="{CF1C3FAD-796D-CC85-63C9-D65333FB8607}" v="324" dt="2021-06-10T02:30:56.153"/>
     <p1510:client id="{E6A93ED1-B210-4B65-841E-28FB22F5A1C9}" v="89" dt="2021-06-10T02:15:08.246"/>
   </p1510:revLst>
 </p1510:revInfo>
@@ -6872,8 +6872,8 @@
           </a:p>
         </p:txBody>
       </p:sp>
-      <mc:AlternateContent xmlns:mc="http://schemas.openxmlformats.org/markup-compatibility/2006">
-        <mc:Choice xmlns:a14="http://schemas.microsoft.com/office/drawing/2010/main" Requires="a14">
+      <mc:AlternateContent xmlns:mc="http://schemas.openxmlformats.org/markup-compatibility/2006" xmlns:a14="http://schemas.microsoft.com/office/drawing/2010/main">
+        <mc:Choice Requires="a14">
           <p:sp>
             <p:nvSpPr>
               <p:cNvPr id="10" name="TextBox 9">
@@ -6902,6 +6902,7 @@
               </a:bodyPr>
               <a:lstStyle/>
               <a:p>
+                <a:pPr/>
                 <a14:m>
                   <m:oMathPara xmlns:m="http://schemas.openxmlformats.org/officeDocument/2006/math">
                     <m:oMathParaPr>
@@ -6913,6 +6914,7 @@
                           <a:solidFill>
                             <a:srgbClr val="002060"/>
                           </a:solidFill>
+                          <a:latin typeface="Cambria Math" panose="02040503050406030204" pitchFamily="18" charset="0"/>
                         </a:rPr>
                         <m:t>𝐶</m:t>
                       </m:r>
@@ -6923,6 +6925,7 @@
                               <a:solidFill>
                                 <a:srgbClr val="002060"/>
                               </a:solidFill>
+                              <a:latin typeface="Cambria Math" panose="02040503050406030204" pitchFamily="18" charset="0"/>
                             </a:rPr>
                           </m:ctrlPr>
                         </m:dPr>
@@ -6934,6 +6937,7 @@
                                   <a:solidFill>
                                     <a:srgbClr val="002060"/>
                                   </a:solidFill>
+                                  <a:latin typeface="Cambria Math" panose="02040503050406030204" pitchFamily="18" charset="0"/>
                                 </a:rPr>
                               </m:ctrlPr>
                             </m:sSubPr>
@@ -6943,6 +6947,7 @@
                                   <a:solidFill>
                                     <a:srgbClr val="002060"/>
                                   </a:solidFill>
+                                  <a:latin typeface="Cambria Math" panose="02040503050406030204" pitchFamily="18" charset="0"/>
                                 </a:rPr>
                                 <m:t>𝑥</m:t>
                               </m:r>
@@ -6953,6 +6958,7 @@
                                   <a:solidFill>
                                     <a:srgbClr val="002060"/>
                                   </a:solidFill>
+                                  <a:latin typeface="Cambria Math" panose="02040503050406030204" pitchFamily="18" charset="0"/>
                                 </a:rPr>
                                 <m:t>𝑡</m:t>
                               </m:r>
@@ -6963,6 +6969,7 @@
                               <a:solidFill>
                                 <a:srgbClr val="002060"/>
                               </a:solidFill>
+                              <a:latin typeface="Cambria Math" panose="02040503050406030204" pitchFamily="18" charset="0"/>
                             </a:rPr>
                             <m:t>,</m:t>
                           </m:r>
@@ -6973,6 +6980,7 @@
                                   <a:solidFill>
                                     <a:srgbClr val="002060"/>
                                   </a:solidFill>
+                                  <a:latin typeface="Cambria Math" panose="02040503050406030204" pitchFamily="18" charset="0"/>
                                 </a:rPr>
                               </m:ctrlPr>
                             </m:sSubPr>
@@ -6982,6 +6990,7 @@
                                   <a:solidFill>
                                     <a:srgbClr val="002060"/>
                                   </a:solidFill>
+                                  <a:latin typeface="Cambria Math" panose="02040503050406030204" pitchFamily="18" charset="0"/>
                                 </a:rPr>
                                 <m:t>𝑣</m:t>
                               </m:r>
@@ -6992,6 +7001,7 @@
                                   <a:solidFill>
                                     <a:srgbClr val="002060"/>
                                   </a:solidFill>
+                                  <a:latin typeface="Cambria Math" panose="02040503050406030204" pitchFamily="18" charset="0"/>
                                 </a:rPr>
                                 <m:t>𝑡</m:t>
                               </m:r>
@@ -7004,6 +7014,7 @@
                           <a:solidFill>
                             <a:srgbClr val="002060"/>
                           </a:solidFill>
+                          <a:latin typeface="Cambria Math" panose="02040503050406030204" pitchFamily="18" charset="0"/>
                         </a:rPr>
                         <m:t>= </m:t>
                       </m:r>
@@ -7016,6 +7027,7 @@
                               <a:solidFill>
                                 <a:srgbClr val="002060"/>
                               </a:solidFill>
+                              <a:latin typeface="Cambria Math" panose="02040503050406030204" pitchFamily="18" charset="0"/>
                             </a:rPr>
                           </m:ctrlPr>
                         </m:naryPr>
@@ -7025,6 +7037,7 @@
                               <a:solidFill>
                                 <a:srgbClr val="002060"/>
                               </a:solidFill>
+                              <a:latin typeface="Cambria Math" panose="02040503050406030204" pitchFamily="18" charset="0"/>
                             </a:rPr>
                             <m:t>𝑡</m:t>
                           </m:r>
@@ -7035,6 +7048,7 @@
                               <a:solidFill>
                                 <a:srgbClr val="002060"/>
                               </a:solidFill>
+                              <a:latin typeface="Cambria Math" panose="02040503050406030204" pitchFamily="18" charset="0"/>
                             </a:rPr>
                             <m:t>𝑇</m:t>
                           </m:r>
@@ -7047,6 +7061,7 @@
                                   <a:solidFill>
                                     <a:srgbClr val="002060"/>
                                   </a:solidFill>
+                                  <a:latin typeface="Cambria Math" panose="02040503050406030204" pitchFamily="18" charset="0"/>
                                 </a:rPr>
                               </m:ctrlPr>
                             </m:sSubPr>
@@ -7056,6 +7071,7 @@
                                   <a:solidFill>
                                     <a:srgbClr val="002060"/>
                                   </a:solidFill>
+                                  <a:latin typeface="Cambria Math" panose="02040503050406030204" pitchFamily="18" charset="0"/>
                                 </a:rPr>
                                 <m:t>{</m:t>
                               </m:r>
@@ -7064,6 +7080,7 @@
                                   <a:solidFill>
                                     <a:srgbClr val="002060"/>
                                   </a:solidFill>
+                                  <a:latin typeface="Cambria Math" panose="02040503050406030204" pitchFamily="18" charset="0"/>
                                 </a:rPr>
                                 <m:t>𝑤</m:t>
                               </m:r>
@@ -7074,6 +7091,7 @@
                                   <a:solidFill>
                                     <a:srgbClr val="002060"/>
                                   </a:solidFill>
+                                  <a:latin typeface="Cambria Math" panose="02040503050406030204" pitchFamily="18" charset="0"/>
                                 </a:rPr>
                                 <m:t>𝑣</m:t>
                               </m:r>
@@ -7086,6 +7104,7 @@
                                   <a:solidFill>
                                     <a:srgbClr val="002060"/>
                                   </a:solidFill>
+                                  <a:latin typeface="Cambria Math" panose="02040503050406030204" pitchFamily="18" charset="0"/>
                                 </a:rPr>
                               </m:ctrlPr>
                             </m:sSupPr>
@@ -7099,6 +7118,7 @@
                                       <a:solidFill>
                                         <a:srgbClr val="002060"/>
                                       </a:solidFill>
+                                      <a:latin typeface="Cambria Math" panose="02040503050406030204" pitchFamily="18" charset="0"/>
                                     </a:rPr>
                                   </m:ctrlPr>
                                 </m:dPr>
@@ -7112,6 +7132,7 @@
                                           <a:solidFill>
                                             <a:srgbClr val="002060"/>
                                           </a:solidFill>
+                                          <a:latin typeface="Cambria Math" panose="02040503050406030204" pitchFamily="18" charset="0"/>
                                         </a:rPr>
                                       </m:ctrlPr>
                                     </m:dPr>
@@ -7123,6 +7144,7 @@
                                               <a:solidFill>
                                                 <a:srgbClr val="002060"/>
                                               </a:solidFill>
+                                              <a:latin typeface="Cambria Math" panose="02040503050406030204" pitchFamily="18" charset="0"/>
                                             </a:rPr>
                                           </m:ctrlPr>
                                         </m:sSubPr>
@@ -7132,6 +7154,7 @@
                                               <a:solidFill>
                                                 <a:srgbClr val="002060"/>
                                               </a:solidFill>
+                                              <a:latin typeface="Cambria Math" panose="02040503050406030204" pitchFamily="18" charset="0"/>
                                             </a:rPr>
                                             <m:t>𝑣</m:t>
                                           </m:r>
@@ -7142,6 +7165,7 @@
                                               <a:solidFill>
                                                 <a:srgbClr val="002060"/>
                                               </a:solidFill>
+                                              <a:latin typeface="Cambria Math" panose="02040503050406030204" pitchFamily="18" charset="0"/>
                                             </a:rPr>
                                             <m:t>𝑡</m:t>
                                           </m:r>
@@ -7152,6 +7176,7 @@
                                           <a:solidFill>
                                             <a:srgbClr val="002060"/>
                                           </a:solidFill>
+                                          <a:latin typeface="Cambria Math" panose="02040503050406030204" pitchFamily="18" charset="0"/>
                                         </a:rPr>
                                         <m:t>−</m:t>
                                       </m:r>
@@ -7162,6 +7187,7 @@
                                               <a:solidFill>
                                                 <a:srgbClr val="002060"/>
                                               </a:solidFill>
+                                              <a:latin typeface="Cambria Math" panose="02040503050406030204" pitchFamily="18" charset="0"/>
                                             </a:rPr>
                                           </m:ctrlPr>
                                         </m:sSubSupPr>
@@ -7171,6 +7197,7 @@
                                               <a:solidFill>
                                                 <a:srgbClr val="002060"/>
                                               </a:solidFill>
+                                              <a:latin typeface="Cambria Math" panose="02040503050406030204" pitchFamily="18" charset="0"/>
                                             </a:rPr>
                                             <m:t>𝑣</m:t>
                                           </m:r>
@@ -7181,6 +7208,7 @@
                                               <a:solidFill>
                                                 <a:srgbClr val="002060"/>
                                               </a:solidFill>
+                                              <a:latin typeface="Cambria Math" panose="02040503050406030204" pitchFamily="18" charset="0"/>
                                             </a:rPr>
                                             <m:t>𝑡</m:t>
                                           </m:r>
@@ -7191,6 +7219,7 @@
                                               <a:solidFill>
                                                 <a:srgbClr val="002060"/>
                                               </a:solidFill>
+                                              <a:latin typeface="Cambria Math" panose="02040503050406030204" pitchFamily="18" charset="0"/>
                                             </a:rPr>
                                             <m:t>𝑟𝑒𝑓</m:t>
                                           </m:r>
@@ -7207,6 +7236,7 @@
                                   <a:solidFill>
                                     <a:srgbClr val="002060"/>
                                   </a:solidFill>
+                                  <a:latin typeface="Cambria Math" panose="02040503050406030204" pitchFamily="18" charset="0"/>
                                 </a:rPr>
                                 <m:t>2</m:t>
                               </m:r>
@@ -7217,6 +7247,7 @@
                               <a:solidFill>
                                 <a:srgbClr val="002060"/>
                               </a:solidFill>
+                              <a:latin typeface="Cambria Math" panose="02040503050406030204" pitchFamily="18" charset="0"/>
                             </a:rPr>
                             <m:t>+</m:t>
                           </m:r>
@@ -7227,6 +7258,7 @@
                                   <a:solidFill>
                                     <a:srgbClr val="002060"/>
                                   </a:solidFill>
+                                  <a:latin typeface="Cambria Math" panose="02040503050406030204" pitchFamily="18" charset="0"/>
                                 </a:rPr>
                               </m:ctrlPr>
                             </m:sSubPr>
@@ -7236,6 +7268,7 @@
                                   <a:solidFill>
                                     <a:srgbClr val="002060"/>
                                   </a:solidFill>
+                                  <a:latin typeface="Cambria Math" panose="02040503050406030204" pitchFamily="18" charset="0"/>
                                 </a:rPr>
                                 <m:t>𝑤</m:t>
                               </m:r>
@@ -7246,6 +7279,7 @@
                                   <a:solidFill>
                                     <a:srgbClr val="002060"/>
                                   </a:solidFill>
+                                  <a:latin typeface="Cambria Math" panose="02040503050406030204" pitchFamily="18" charset="0"/>
                                 </a:rPr>
                                 <m:t>𝑑</m:t>
                               </m:r>
@@ -7258,6 +7292,7 @@
                                   <a:solidFill>
                                     <a:srgbClr val="002060"/>
                                   </a:solidFill>
+                                  <a:latin typeface="Cambria Math" panose="02040503050406030204" pitchFamily="18" charset="0"/>
                                 </a:rPr>
                               </m:ctrlPr>
                             </m:sSupPr>
@@ -7271,6 +7306,7 @@
                                       <a:solidFill>
                                         <a:srgbClr val="002060"/>
                                       </a:solidFill>
+                                      <a:latin typeface="Cambria Math" panose="02040503050406030204" pitchFamily="18" charset="0"/>
                                     </a:rPr>
                                   </m:ctrlPr>
                                 </m:dPr>
@@ -7284,6 +7320,7 @@
                                           <a:solidFill>
                                             <a:srgbClr val="002060"/>
                                           </a:solidFill>
+                                          <a:latin typeface="Cambria Math" panose="02040503050406030204" pitchFamily="18" charset="0"/>
                                         </a:rPr>
                                       </m:ctrlPr>
                                     </m:dPr>
@@ -7295,6 +7332,7 @@
                                               <a:solidFill>
                                                 <a:srgbClr val="002060"/>
                                               </a:solidFill>
+                                              <a:latin typeface="Cambria Math" panose="02040503050406030204" pitchFamily="18" charset="0"/>
                                             </a:rPr>
                                           </m:ctrlPr>
                                         </m:sSubPr>
@@ -7304,6 +7342,7 @@
                                               <a:solidFill>
                                                 <a:srgbClr val="002060"/>
                                               </a:solidFill>
+                                              <a:latin typeface="Cambria Math" panose="02040503050406030204" pitchFamily="18" charset="0"/>
                                             </a:rPr>
                                             <m:t>𝑑</m:t>
                                           </m:r>
@@ -7314,6 +7353,7 @@
                                               <a:solidFill>
                                                 <a:srgbClr val="002060"/>
                                               </a:solidFill>
+                                              <a:latin typeface="Cambria Math" panose="02040503050406030204" pitchFamily="18" charset="0"/>
                                             </a:rPr>
                                             <m:t>𝑡</m:t>
                                           </m:r>
@@ -7330,6 +7370,7 @@
                                   <a:solidFill>
                                     <a:srgbClr val="002060"/>
                                   </a:solidFill>
+                                  <a:latin typeface="Cambria Math" panose="02040503050406030204" pitchFamily="18" charset="0"/>
                                 </a:rPr>
                                 <m:t>2</m:t>
                               </m:r>
@@ -7340,6 +7381,7 @@
                               <a:solidFill>
                                 <a:srgbClr val="002060"/>
                               </a:solidFill>
+                              <a:latin typeface="Cambria Math" panose="02040503050406030204" pitchFamily="18" charset="0"/>
                             </a:rPr>
                             <m:t>+</m:t>
                           </m:r>
@@ -7350,6 +7392,7 @@
                                   <a:solidFill>
                                     <a:srgbClr val="002060"/>
                                   </a:solidFill>
+                                  <a:latin typeface="Cambria Math" panose="02040503050406030204" pitchFamily="18" charset="0"/>
                                 </a:rPr>
                               </m:ctrlPr>
                             </m:sSubPr>
@@ -7359,6 +7402,7 @@
                                   <a:solidFill>
                                     <a:srgbClr val="002060"/>
                                   </a:solidFill>
+                                  <a:latin typeface="Cambria Math" panose="02040503050406030204" pitchFamily="18" charset="0"/>
                                 </a:rPr>
                                 <m:t>𝑤</m:t>
                               </m:r>
@@ -7369,6 +7413,7 @@
                                   <a:solidFill>
                                     <a:srgbClr val="002060"/>
                                   </a:solidFill>
+                                  <a:latin typeface="Cambria Math" panose="02040503050406030204" pitchFamily="18" charset="0"/>
                                 </a:rPr>
                                 <m:t>𝜙</m:t>
                               </m:r>
@@ -7381,6 +7426,7 @@
                                   <a:solidFill>
                                     <a:srgbClr val="002060"/>
                                   </a:solidFill>
+                                  <a:latin typeface="Cambria Math" panose="02040503050406030204" pitchFamily="18" charset="0"/>
                                 </a:rPr>
                               </m:ctrlPr>
                             </m:sSupPr>
@@ -7394,6 +7440,7 @@
                                       <a:solidFill>
                                         <a:srgbClr val="002060"/>
                                       </a:solidFill>
+                                      <a:latin typeface="Cambria Math" panose="02040503050406030204" pitchFamily="18" charset="0"/>
                                     </a:rPr>
                                   </m:ctrlPr>
                                 </m:dPr>
@@ -7407,6 +7454,7 @@
                                           <a:solidFill>
                                             <a:srgbClr val="002060"/>
                                           </a:solidFill>
+                                          <a:latin typeface="Cambria Math" panose="02040503050406030204" pitchFamily="18" charset="0"/>
                                         </a:rPr>
                                       </m:ctrlPr>
                                     </m:dPr>
@@ -7418,6 +7466,7 @@
                                               <a:solidFill>
                                                 <a:srgbClr val="002060"/>
                                               </a:solidFill>
+                                              <a:latin typeface="Cambria Math" panose="02040503050406030204" pitchFamily="18" charset="0"/>
                                             </a:rPr>
                                           </m:ctrlPr>
                                         </m:sSubPr>
@@ -7427,6 +7476,7 @@
                                               <a:solidFill>
                                                 <a:srgbClr val="002060"/>
                                               </a:solidFill>
+                                              <a:latin typeface="Cambria Math" panose="02040503050406030204" pitchFamily="18" charset="0"/>
                                             </a:rPr>
                                             <m:t>𝜙</m:t>
                                           </m:r>
@@ -7437,6 +7487,7 @@
                                               <a:solidFill>
                                                 <a:srgbClr val="002060"/>
                                               </a:solidFill>
+                                              <a:latin typeface="Cambria Math" panose="02040503050406030204" pitchFamily="18" charset="0"/>
                                             </a:rPr>
                                             <m:t>𝑡</m:t>
                                           </m:r>
@@ -7453,6 +7504,7 @@
                                   <a:solidFill>
                                     <a:srgbClr val="002060"/>
                                   </a:solidFill>
+                                  <a:latin typeface="Cambria Math" panose="02040503050406030204" pitchFamily="18" charset="0"/>
                                 </a:rPr>
                                 <m:t>2</m:t>
                               </m:r>
@@ -7463,6 +7515,7 @@
                               <a:solidFill>
                                 <a:srgbClr val="002060"/>
                               </a:solidFill>
+                              <a:latin typeface="Cambria Math" panose="02040503050406030204" pitchFamily="18" charset="0"/>
                             </a:rPr>
                             <m:t>}−</m:t>
                           </m:r>
@@ -7475,6 +7528,7 @@
                                   <a:solidFill>
                                     <a:srgbClr val="002060"/>
                                   </a:solidFill>
+                                  <a:latin typeface="Cambria Math" panose="02040503050406030204" pitchFamily="18" charset="0"/>
                                 </a:rPr>
                               </m:ctrlPr>
                             </m:naryPr>
@@ -7484,6 +7538,7 @@
                                   <a:solidFill>
                                     <a:srgbClr val="002060"/>
                                   </a:solidFill>
+                                  <a:latin typeface="Cambria Math" panose="02040503050406030204" pitchFamily="18" charset="0"/>
                                 </a:rPr>
                                 <m:t>𝑗</m:t>
                               </m:r>
@@ -7492,6 +7547,7 @@
                                   <a:solidFill>
                                     <a:srgbClr val="002060"/>
                                   </a:solidFill>
+                                  <a:latin typeface="Cambria Math" panose="02040503050406030204" pitchFamily="18" charset="0"/>
                                 </a:rPr>
                                 <m:t>  </m:t>
                               </m:r>
@@ -7505,6 +7561,7 @@
                                       <a:solidFill>
                                         <a:srgbClr val="002060"/>
                                       </a:solidFill>
+                                      <a:latin typeface="Cambria Math" panose="02040503050406030204" pitchFamily="18" charset="0"/>
                                     </a:rPr>
                                   </m:ctrlPr>
                                 </m:sSubPr>
@@ -7514,6 +7571,7 @@
                                       <a:solidFill>
                                         <a:srgbClr val="002060"/>
                                       </a:solidFill>
+                                      <a:latin typeface="Cambria Math" panose="02040503050406030204" pitchFamily="18" charset="0"/>
                                     </a:rPr>
                                     <m:t>𝑤</m:t>
                                   </m:r>
@@ -7524,6 +7582,7 @@
                                       <a:solidFill>
                                         <a:srgbClr val="002060"/>
                                       </a:solidFill>
+                                      <a:latin typeface="Cambria Math" panose="02040503050406030204" pitchFamily="18" charset="0"/>
                                     </a:rPr>
                                     <m:t>𝑖𝑗</m:t>
                                   </m:r>
@@ -7534,6 +7593,7 @@
                                   <a:solidFill>
                                     <a:srgbClr val="002060"/>
                                   </a:solidFill>
+                                  <a:latin typeface="Cambria Math" panose="02040503050406030204" pitchFamily="18" charset="0"/>
                                 </a:rPr>
                                 <m:t> </m:t>
                               </m:r>
@@ -7544,6 +7604,7 @@
                                       <a:solidFill>
                                         <a:srgbClr val="002060"/>
                                       </a:solidFill>
+                                      <a:latin typeface="Cambria Math" panose="02040503050406030204" pitchFamily="18" charset="0"/>
                                     </a:rPr>
                                   </m:ctrlPr>
                                 </m:sSupPr>
@@ -7553,6 +7614,7 @@
                                       <a:solidFill>
                                         <a:srgbClr val="002060"/>
                                       </a:solidFill>
+                                      <a:latin typeface="Cambria Math" panose="02040503050406030204" pitchFamily="18" charset="0"/>
                                     </a:rPr>
                                     <m:t>𝑒</m:t>
                                   </m:r>
@@ -7563,6 +7625,7 @@
                                       <a:solidFill>
                                         <a:srgbClr val="002060"/>
                                       </a:solidFill>
+                                      <a:latin typeface="Cambria Math" panose="02040503050406030204" pitchFamily="18" charset="0"/>
                                     </a:rPr>
                                     <m:t>𝜁</m:t>
                                   </m:r>
@@ -7571,6 +7634,7 @@
                                       <a:solidFill>
                                         <a:srgbClr val="002060"/>
                                       </a:solidFill>
+                                      <a:latin typeface="Cambria Math" panose="02040503050406030204" pitchFamily="18" charset="0"/>
                                     </a:rPr>
                                     <m:t>(</m:t>
                                   </m:r>
@@ -7581,6 +7645,7 @@
                                           <a:solidFill>
                                             <a:srgbClr val="002060"/>
                                           </a:solidFill>
+                                          <a:latin typeface="Cambria Math" panose="02040503050406030204" pitchFamily="18" charset="0"/>
                                         </a:rPr>
                                       </m:ctrlPr>
                                     </m:sSubPr>
@@ -7590,6 +7655,7 @@
                                           <a:solidFill>
                                             <a:srgbClr val="002060"/>
                                           </a:solidFill>
+                                          <a:latin typeface="Cambria Math" panose="02040503050406030204" pitchFamily="18" charset="0"/>
                                         </a:rPr>
                                         <m:t>𝑟</m:t>
                                       </m:r>
@@ -7600,6 +7666,7 @@
                                           <a:solidFill>
                                             <a:srgbClr val="002060"/>
                                           </a:solidFill>
+                                          <a:latin typeface="Cambria Math" panose="02040503050406030204" pitchFamily="18" charset="0"/>
                                         </a:rPr>
                                         <m:t>𝑎</m:t>
                                       </m:r>
@@ -7610,6 +7677,7 @@
                                       <a:solidFill>
                                         <a:srgbClr val="002060"/>
                                       </a:solidFill>
+                                      <a:latin typeface="Cambria Math" panose="02040503050406030204" pitchFamily="18" charset="0"/>
                                     </a:rPr>
                                     <m:t>−</m:t>
                                   </m:r>
@@ -7620,6 +7688,7 @@
                                           <a:solidFill>
                                             <a:srgbClr val="002060"/>
                                           </a:solidFill>
+                                          <a:latin typeface="Cambria Math" panose="02040503050406030204" pitchFamily="18" charset="0"/>
                                         </a:rPr>
                                       </m:ctrlPr>
                                     </m:sSubPr>
@@ -7629,6 +7698,7 @@
                                           <a:solidFill>
                                             <a:srgbClr val="002060"/>
                                           </a:solidFill>
+                                          <a:latin typeface="Cambria Math" panose="02040503050406030204" pitchFamily="18" charset="0"/>
                                         </a:rPr>
                                         <m:t>𝑟</m:t>
                                       </m:r>
@@ -7639,6 +7709,7 @@
                                           <a:solidFill>
                                             <a:srgbClr val="002060"/>
                                           </a:solidFill>
+                                          <a:latin typeface="Cambria Math" panose="02040503050406030204" pitchFamily="18" charset="0"/>
                                         </a:rPr>
                                         <m:t>𝑖𝑗</m:t>
                                       </m:r>
@@ -7649,6 +7720,7 @@
                                       <a:solidFill>
                                         <a:srgbClr val="002060"/>
                                       </a:solidFill>
+                                      <a:latin typeface="Cambria Math" panose="02040503050406030204" pitchFamily="18" charset="0"/>
                                     </a:rPr>
                                     <m:t>)</m:t>
                                   </m:r>
@@ -7661,6 +7733,7 @@
                                       <a:solidFill>
                                         <a:srgbClr val="002060"/>
                                       </a:solidFill>
+                                      <a:latin typeface="Cambria Math" panose="02040503050406030204" pitchFamily="18" charset="0"/>
                                     </a:rPr>
                                   </m:ctrlPr>
                                 </m:sSubPr>
@@ -7673,6 +7746,7 @@
                                           <a:solidFill>
                                             <a:srgbClr val="002060"/>
                                           </a:solidFill>
+                                          <a:latin typeface="Cambria Math" panose="02040503050406030204" pitchFamily="18" charset="0"/>
                                         </a:rPr>
                                       </m:ctrlPr>
                                     </m:accPr>
@@ -7682,6 +7756,7 @@
                                           <a:solidFill>
                                             <a:srgbClr val="002060"/>
                                           </a:solidFill>
+                                          <a:latin typeface="Cambria Math" panose="02040503050406030204" pitchFamily="18" charset="0"/>
                                         </a:rPr>
                                         <m:t>𝑟</m:t>
                                       </m:r>
@@ -7694,6 +7769,7 @@
                                       <a:solidFill>
                                         <a:srgbClr val="002060"/>
                                       </a:solidFill>
+                                      <a:latin typeface="Cambria Math" panose="02040503050406030204" pitchFamily="18" charset="0"/>
                                     </a:rPr>
                                     <m:t>𝑖𝑗</m:t>
                                   </m:r>
@@ -7715,7 +7791,7 @@
             </p:txBody>
           </p:sp>
         </mc:Choice>
-        <mc:Fallback>
+        <mc:Fallback xmlns="">
           <p:sp>
             <p:nvSpPr>
               <p:cNvPr id="10" name="TextBox 9">
@@ -7760,8 +7836,8 @@
           </p:sp>
         </mc:Fallback>
       </mc:AlternateContent>
-      <mc:AlternateContent xmlns:mc="http://schemas.openxmlformats.org/markup-compatibility/2006">
-        <mc:Choice xmlns:a14="http://schemas.microsoft.com/office/drawing/2010/main" Requires="a14">
+      <mc:AlternateContent xmlns:mc="http://schemas.openxmlformats.org/markup-compatibility/2006" xmlns:a14="http://schemas.microsoft.com/office/drawing/2010/main">
+        <mc:Choice Requires="a14">
           <p:sp>
             <p:nvSpPr>
               <p:cNvPr id="12" name="TextBox 11">
@@ -7806,6 +7882,7 @@
                             <a:solidFill>
                               <a:srgbClr val="002060"/>
                             </a:solidFill>
+                            <a:latin typeface="Cambria Math" panose="02040503050406030204" pitchFamily="18" charset="0"/>
                           </a:rPr>
                         </m:ctrlPr>
                       </m:sSubPr>
@@ -7815,6 +7892,7 @@
                             <a:solidFill>
                               <a:srgbClr val="002060"/>
                             </a:solidFill>
+                            <a:latin typeface="Cambria Math" panose="02040503050406030204" pitchFamily="18" charset="0"/>
                           </a:rPr>
                           <m:t>𝑤</m:t>
                         </m:r>
@@ -7825,6 +7903,7 @@
                             <a:solidFill>
                               <a:srgbClr val="002060"/>
                             </a:solidFill>
+                            <a:latin typeface="Cambria Math" panose="02040503050406030204" pitchFamily="18" charset="0"/>
                           </a:rPr>
                           <m:t>𝑣</m:t>
                         </m:r>
@@ -7849,6 +7928,7 @@
                         <a:solidFill>
                           <a:srgbClr val="002060"/>
                         </a:solidFill>
+                        <a:latin typeface="Cambria Math" panose="02040503050406030204" pitchFamily="18" charset="0"/>
                       </a:rPr>
                       <m:t>𝑚</m:t>
                     </m:r>
@@ -7857,6 +7937,7 @@
                         <a:solidFill>
                           <a:srgbClr val="002060"/>
                         </a:solidFill>
+                        <a:latin typeface="Cambria Math" panose="02040503050406030204" pitchFamily="18" charset="0"/>
                       </a:rPr>
                       <m:t>/</m:t>
                     </m:r>
@@ -7867,6 +7948,7 @@
                             <a:solidFill>
                               <a:srgbClr val="002060"/>
                             </a:solidFill>
+                            <a:latin typeface="Cambria Math" panose="02040503050406030204" pitchFamily="18" charset="0"/>
                           </a:rPr>
                         </m:ctrlPr>
                       </m:sSupPr>
@@ -7876,6 +7958,7 @@
                             <a:solidFill>
                               <a:srgbClr val="002060"/>
                             </a:solidFill>
+                            <a:latin typeface="Cambria Math" panose="02040503050406030204" pitchFamily="18" charset="0"/>
                           </a:rPr>
                           <m:t>𝑠</m:t>
                         </m:r>
@@ -7886,6 +7969,7 @@
                             <a:solidFill>
                               <a:srgbClr val="002060"/>
                             </a:solidFill>
+                            <a:latin typeface="Cambria Math" panose="02040503050406030204" pitchFamily="18" charset="0"/>
                           </a:rPr>
                           <m:t>2</m:t>
                         </m:r>
@@ -7896,6 +7980,7 @@
                         <a:solidFill>
                           <a:srgbClr val="002060"/>
                         </a:solidFill>
+                        <a:latin typeface="Cambria Math" panose="02040503050406030204" pitchFamily="18" charset="0"/>
                       </a:rPr>
                       <m:t>)</m:t>
                     </m:r>
@@ -8089,6 +8174,7 @@
                             <a:solidFill>
                               <a:srgbClr val="002060"/>
                             </a:solidFill>
+                            <a:latin typeface="Cambria Math" panose="02040503050406030204" pitchFamily="18" charset="0"/>
                           </a:rPr>
                         </m:ctrlPr>
                       </m:sSubPr>
@@ -8098,6 +8184,7 @@
                             <a:solidFill>
                               <a:srgbClr val="002060"/>
                             </a:solidFill>
+                            <a:latin typeface="Cambria Math" panose="02040503050406030204" pitchFamily="18" charset="0"/>
                           </a:rPr>
                           <m:t>𝑤</m:t>
                         </m:r>
@@ -8108,6 +8195,7 @@
                             <a:solidFill>
                               <a:srgbClr val="002060"/>
                             </a:solidFill>
+                            <a:latin typeface="Cambria Math" panose="02040503050406030204" pitchFamily="18" charset="0"/>
                           </a:rPr>
                           <m:t>𝑣</m:t>
                         </m:r>
@@ -8132,6 +8220,7 @@
                         <a:solidFill>
                           <a:srgbClr val="002060"/>
                         </a:solidFill>
+                        <a:latin typeface="Cambria Math" panose="02040503050406030204" pitchFamily="18" charset="0"/>
                       </a:rPr>
                       <m:t>𝑚</m:t>
                     </m:r>
@@ -8140,6 +8229,7 @@
                         <a:solidFill>
                           <a:srgbClr val="002060"/>
                         </a:solidFill>
+                        <a:latin typeface="Cambria Math" panose="02040503050406030204" pitchFamily="18" charset="0"/>
                       </a:rPr>
                       <m:t>/</m:t>
                     </m:r>
@@ -8150,6 +8240,7 @@
                             <a:solidFill>
                               <a:srgbClr val="002060"/>
                             </a:solidFill>
+                            <a:latin typeface="Cambria Math" panose="02040503050406030204" pitchFamily="18" charset="0"/>
                           </a:rPr>
                         </m:ctrlPr>
                       </m:sSupPr>
@@ -8159,6 +8250,7 @@
                             <a:solidFill>
                               <a:srgbClr val="002060"/>
                             </a:solidFill>
+                            <a:latin typeface="Cambria Math" panose="02040503050406030204" pitchFamily="18" charset="0"/>
                           </a:rPr>
                           <m:t>𝑠</m:t>
                         </m:r>
@@ -8169,6 +8261,7 @@
                             <a:solidFill>
                               <a:srgbClr val="002060"/>
                             </a:solidFill>
+                            <a:latin typeface="Cambria Math" panose="02040503050406030204" pitchFamily="18" charset="0"/>
                           </a:rPr>
                           <m:t>2</m:t>
                         </m:r>
@@ -8179,6 +8272,7 @@
                         <a:solidFill>
                           <a:srgbClr val="002060"/>
                         </a:solidFill>
+                        <a:latin typeface="Cambria Math" panose="02040503050406030204" pitchFamily="18" charset="0"/>
                       </a:rPr>
                       <m:t>)</m:t>
                     </m:r>
@@ -8472,6 +8566,7 @@
                             <a:solidFill>
                               <a:srgbClr val="002060"/>
                             </a:solidFill>
+                            <a:latin typeface="Cambria Math" panose="02040503050406030204" pitchFamily="18" charset="0"/>
                           </a:rPr>
                         </m:ctrlPr>
                       </m:sSubPr>
@@ -8481,6 +8576,7 @@
                             <a:solidFill>
                               <a:srgbClr val="002060"/>
                             </a:solidFill>
+                            <a:latin typeface="Cambria Math" panose="02040503050406030204" pitchFamily="18" charset="0"/>
                           </a:rPr>
                           <m:t>𝑤</m:t>
                         </m:r>
@@ -8491,6 +8587,7 @@
                             <a:solidFill>
                               <a:srgbClr val="002060"/>
                             </a:solidFill>
+                            <a:latin typeface="Cambria Math" panose="02040503050406030204" pitchFamily="18" charset="0"/>
                           </a:rPr>
                           <m:t>𝜙</m:t>
                         </m:r>
@@ -8515,6 +8612,7 @@
                         <a:solidFill>
                           <a:srgbClr val="002060"/>
                         </a:solidFill>
+                        <a:latin typeface="Cambria Math" panose="02040503050406030204" pitchFamily="18" charset="0"/>
                       </a:rPr>
                       <m:t>𝑟𝑎𝑑</m:t>
                     </m:r>
@@ -8523,6 +8621,7 @@
                         <a:solidFill>
                           <a:srgbClr val="002060"/>
                         </a:solidFill>
+                        <a:latin typeface="Cambria Math" panose="02040503050406030204" pitchFamily="18" charset="0"/>
                       </a:rPr>
                       <m:t>)</m:t>
                     </m:r>
@@ -8716,6 +8815,7 @@
                             <a:solidFill>
                               <a:srgbClr val="002060"/>
                             </a:solidFill>
+                            <a:latin typeface="Cambria Math" panose="02040503050406030204" pitchFamily="18" charset="0"/>
                           </a:rPr>
                         </m:ctrlPr>
                       </m:sSubPr>
@@ -8725,6 +8825,7 @@
                             <a:solidFill>
                               <a:srgbClr val="002060"/>
                             </a:solidFill>
+                            <a:latin typeface="Cambria Math" panose="02040503050406030204" pitchFamily="18" charset="0"/>
                           </a:rPr>
                           <m:t>𝑤</m:t>
                         </m:r>
@@ -8735,6 +8836,7 @@
                             <a:solidFill>
                               <a:srgbClr val="002060"/>
                             </a:solidFill>
+                            <a:latin typeface="Cambria Math" panose="02040503050406030204" pitchFamily="18" charset="0"/>
                           </a:rPr>
                           <m:t>𝑖𝑗</m:t>
                         </m:r>
@@ -9005,6 +9107,7 @@
                         <a:solidFill>
                           <a:srgbClr val="002060"/>
                         </a:solidFill>
+                        <a:latin typeface="Cambria Math" panose="02040503050406030204" pitchFamily="18" charset="0"/>
                       </a:rPr>
                       <m:t>𝜁</m:t>
                     </m:r>
@@ -9361,7 +9464,7 @@
             </p:txBody>
           </p:sp>
         </mc:Choice>
-        <mc:Fallback>
+        <mc:Fallback xmlns="">
           <p:sp>
             <p:nvSpPr>
               <p:cNvPr id="12" name="TextBox 11">
@@ -9566,7 +9669,7 @@
               <p:nvPr>
                 <p:extLst>
                   <p:ext uri="{D42A27DB-BD31-4B8C-83A1-F6EECF244321}">
-                    <p14:modId xmlns:p14="http://schemas.microsoft.com/office/powerpoint/2010/main" val="1152320968"/>
+                    <p14:modId xmlns:p14="http://schemas.microsoft.com/office/powerpoint/2010/main" val="301540686"/>
                   </p:ext>
                 </p:extLst>
               </p:nvPr>
@@ -9710,23 +9813,26 @@
                               <m:sSub>
                                 <m:sSubPr>
                                   <m:ctrlPr>
-                                    <a:rPr lang="en-US" sz="1800">
+                                    <a:rPr lang="en-US" sz="1800" b="0" i="1">
                                       <a:effectLst/>
+                                      <a:latin typeface="Cambria Math" panose="02040503050406030204" pitchFamily="18" charset="0"/>
                                     </a:rPr>
                                   </m:ctrlPr>
                                 </m:sSubPr>
                                 <m:e>
                                   <m:r>
-                                    <a:rPr lang="en-US" sz="1800">
+                                    <a:rPr lang="en-US" sz="1800" b="0" i="1">
                                       <a:effectLst/>
+                                      <a:latin typeface="Cambria Math" panose="02040503050406030204" pitchFamily="18" charset="0"/>
                                     </a:rPr>
                                     <m:t>𝑤</m:t>
                                   </m:r>
                                 </m:e>
                                 <m:sub>
                                   <m:r>
-                                    <a:rPr lang="en-US" sz="1800">
+                                    <a:rPr lang="en-US" sz="1800" b="0" i="1">
                                       <a:effectLst/>
+                                      <a:latin typeface="Cambria Math" panose="02040503050406030204" pitchFamily="18" charset="0"/>
                                     </a:rPr>
                                     <m:t>𝑣</m:t>
                                   </m:r>
@@ -9735,7 +9841,7 @@
                             </m:oMath>
                           </a14:m>
                           <a:r>
-                            <a:rPr lang="en-US" sz="1800" dirty="0">
+                            <a:rPr lang="en-US" sz="1800" b="0" dirty="0">
                               <a:effectLst/>
                               <a:latin typeface="Verdana" panose="020B0604030504040204" pitchFamily="34" charset="0"/>
                               <a:ea typeface="Verdana" panose="020B0604030504040204" pitchFamily="34" charset="0"/>
@@ -9745,51 +9851,60 @@
                           <a14:m>
                             <m:oMath xmlns:m="http://schemas.openxmlformats.org/officeDocument/2006/math">
                               <m:r>
-                                <a:rPr lang="en-US" sz="1800">
+                                <m:rPr>
+                                  <m:sty m:val="p"/>
+                                </m:rPr>
+                                <a:rPr lang="en-US" sz="1800" b="0" i="1">
                                   <a:effectLst/>
+                                  <a:latin typeface="Cambria Math" panose="02040503050406030204" pitchFamily="18" charset="0"/>
                                 </a:rPr>
-                                <m:t>𝑚</m:t>
+                                <m:t>m</m:t>
                               </m:r>
                               <m:r>
-                                <a:rPr lang="en-US" sz="1800">
+                                <a:rPr lang="en-US" sz="1800" b="0">
                                   <a:effectLst/>
+                                  <a:latin typeface="Cambria Math" panose="02040503050406030204" pitchFamily="18" charset="0"/>
                                 </a:rPr>
                                 <m:t>/</m:t>
                               </m:r>
                               <m:sSup>
                                 <m:sSupPr>
                                   <m:ctrlPr>
-                                    <a:rPr lang="en-US" sz="1800">
+                                    <a:rPr lang="en-US" sz="1800" b="0" i="1">
                                       <a:effectLst/>
+                                      <a:latin typeface="Cambria Math" panose="02040503050406030204" pitchFamily="18" charset="0"/>
                                     </a:rPr>
                                   </m:ctrlPr>
                                 </m:sSupPr>
                                 <m:e>
                                   <m:r>
-                                    <a:rPr lang="en-US" sz="1800">
+                                    <a:rPr lang="en-US" sz="1800" b="0" i="1">
                                       <a:effectLst/>
+                                      <a:latin typeface="Cambria Math" panose="02040503050406030204" pitchFamily="18" charset="0"/>
                                     </a:rPr>
                                     <m:t>𝑠</m:t>
                                   </m:r>
                                 </m:e>
                                 <m:sup>
                                   <m:r>
-                                    <a:rPr lang="en-US" sz="1800">
+                                    <a:rPr lang="en-US" sz="1800" b="0">
                                       <a:effectLst/>
+                                      <a:latin typeface="Cambria Math" panose="02040503050406030204" pitchFamily="18" charset="0"/>
                                     </a:rPr>
                                     <m:t>2</m:t>
                                   </m:r>
                                 </m:sup>
                               </m:sSup>
                               <m:r>
-                                <a:rPr lang="en-US" sz="1800">
+                                <a:rPr lang="en-US" sz="1800" b="0">
                                   <a:effectLst/>
+                                  <a:latin typeface="Cambria Math" panose="02040503050406030204" pitchFamily="18" charset="0"/>
                                 </a:rPr>
                                 <m:t>)</m:t>
                               </m:r>
                             </m:oMath>
                           </a14:m>
-                          <a:endParaRPr lang="en-US" sz="1800" dirty="0">
+                          <a:endParaRPr lang="en-US" sz="1800" b="0" dirty="0">
                             <a:effectLst/>
                             <a:latin typeface="Verdana" panose="020B0604030504040204" pitchFamily="34" charset="0"/>
                             <a:ea typeface="Verdana" panose="020B0604030504040204" pitchFamily="34" charset="0"/>
@@ -9861,23 +9976,26 @@
                               <m:sSub>
                                 <m:sSubPr>
                                   <m:ctrlPr>
-                                    <a:rPr lang="en-US" sz="1800">
+                                    <a:rPr lang="en-US" sz="1800" b="0" i="1">
                                       <a:effectLst/>
+                                      <a:latin typeface="Cambria Math" panose="02040503050406030204" pitchFamily="18" charset="0"/>
                                     </a:rPr>
                                   </m:ctrlPr>
                                 </m:sSubPr>
                                 <m:e>
                                   <m:r>
-                                    <a:rPr lang="en-US" sz="1800">
+                                    <a:rPr lang="en-US" sz="1800" b="0" i="1">
                                       <a:effectLst/>
+                                      <a:latin typeface="Cambria Math" panose="02040503050406030204" pitchFamily="18" charset="0"/>
                                     </a:rPr>
                                     <m:t>𝑤</m:t>
                                   </m:r>
                                 </m:e>
                                 <m:sub>
                                   <m:r>
-                                    <a:rPr lang="en-US" sz="1800">
+                                    <a:rPr lang="en-US" sz="1800" b="0" i="1">
                                       <a:effectLst/>
+                                      <a:latin typeface="Cambria Math" panose="02040503050406030204" pitchFamily="18" charset="0"/>
                                     </a:rPr>
                                     <m:t>𝑑</m:t>
                                   </m:r>
@@ -9886,7 +10004,7 @@
                             </m:oMath>
                           </a14:m>
                           <a:r>
-                            <a:rPr lang="en-US" sz="1800">
+                            <a:rPr lang="en-US" sz="1800" b="0">
                               <a:effectLst/>
                               <a:latin typeface="Verdana" panose="020B0604030504040204" pitchFamily="34" charset="0"/>
                               <a:ea typeface="Verdana" panose="020B0604030504040204" pitchFamily="34" charset="0"/>
@@ -9896,20 +10014,25 @@
                           <a14:m>
                             <m:oMath xmlns:m="http://schemas.openxmlformats.org/officeDocument/2006/math">
                               <m:r>
-                                <a:rPr lang="en-US" sz="1800">
+                                <m:rPr>
+                                  <m:sty m:val="p"/>
+                                </m:rPr>
+                                <a:rPr lang="en-US" sz="1800" b="0" i="1">
                                   <a:effectLst/>
+                                  <a:latin typeface="Cambria Math" panose="02040503050406030204" pitchFamily="18" charset="0"/>
                                 </a:rPr>
-                                <m:t>𝑚</m:t>
+                                <m:t>m</m:t>
                               </m:r>
                               <m:r>
-                                <a:rPr lang="en-US" sz="1800">
+                                <a:rPr lang="en-US" sz="1800" b="0">
                                   <a:effectLst/>
+                                  <a:latin typeface="Cambria Math" panose="02040503050406030204" pitchFamily="18" charset="0"/>
                                 </a:rPr>
                                 <m:t>)</m:t>
                               </m:r>
                             </m:oMath>
                           </a14:m>
-                          <a:endParaRPr lang="en-US" sz="1800">
+                          <a:endParaRPr lang="en-US" sz="1800" b="0">
                             <a:effectLst/>
                             <a:latin typeface="Verdana" panose="020B0604030504040204" pitchFamily="34" charset="0"/>
                             <a:ea typeface="Verdana" panose="020B0604030504040204" pitchFamily="34" charset="0"/>
@@ -9981,23 +10104,26 @@
                               <m:sSub>
                                 <m:sSubPr>
                                   <m:ctrlPr>
-                                    <a:rPr lang="en-US" sz="1800">
+                                    <a:rPr lang="en-US" sz="1800" b="0" i="1">
                                       <a:effectLst/>
+                                      <a:latin typeface="Cambria Math" panose="02040503050406030204" pitchFamily="18" charset="0"/>
                                     </a:rPr>
                                   </m:ctrlPr>
                                 </m:sSubPr>
                                 <m:e>
                                   <m:r>
-                                    <a:rPr lang="en-US" sz="1800">
+                                    <a:rPr lang="en-US" sz="1800" b="0" i="1">
                                       <a:effectLst/>
+                                      <a:latin typeface="Cambria Math" panose="02040503050406030204" pitchFamily="18" charset="0"/>
                                     </a:rPr>
                                     <m:t>𝑤</m:t>
                                   </m:r>
                                 </m:e>
                                 <m:sub>
                                   <m:r>
-                                    <a:rPr lang="en-US" sz="1800">
+                                    <a:rPr lang="en-US" sz="1800" b="0" i="1">
                                       <a:effectLst/>
+                                      <a:latin typeface="Cambria Math" panose="02040503050406030204" pitchFamily="18" charset="0"/>
                                     </a:rPr>
                                     <m:t>𝜙</m:t>
                                   </m:r>
@@ -10006,7 +10132,7 @@
                             </m:oMath>
                           </a14:m>
                           <a:r>
-                            <a:rPr lang="en-US" sz="1800">
+                            <a:rPr lang="en-US" sz="1800" b="0">
                               <a:effectLst/>
                               <a:latin typeface="Verdana" panose="020B0604030504040204" pitchFamily="34" charset="0"/>
                               <a:ea typeface="Verdana" panose="020B0604030504040204" pitchFamily="34" charset="0"/>
@@ -10016,20 +10142,25 @@
                           <a14:m>
                             <m:oMath xmlns:m="http://schemas.openxmlformats.org/officeDocument/2006/math">
                               <m:r>
-                                <a:rPr lang="en-US" sz="1800">
+                                <m:rPr>
+                                  <m:sty m:val="p"/>
+                                </m:rPr>
+                                <a:rPr lang="en-US" sz="1800" b="0" i="1">
                                   <a:effectLst/>
+                                  <a:latin typeface="Cambria Math" panose="02040503050406030204" pitchFamily="18" charset="0"/>
                                 </a:rPr>
-                                <m:t>𝑟𝑎𝑑</m:t>
+                                <m:t>rad</m:t>
                               </m:r>
                               <m:r>
-                                <a:rPr lang="en-US" sz="1800">
+                                <a:rPr lang="en-US" sz="1800" b="0">
                                   <a:effectLst/>
+                                  <a:latin typeface="Cambria Math" panose="02040503050406030204" pitchFamily="18" charset="0"/>
                                 </a:rPr>
                                 <m:t>)</m:t>
                               </m:r>
                             </m:oMath>
                           </a14:m>
-                          <a:endParaRPr lang="en-US" sz="1800">
+                          <a:endParaRPr lang="en-US" sz="1800" b="0">
                             <a:effectLst/>
                             <a:latin typeface="Verdana" panose="020B0604030504040204" pitchFamily="34" charset="0"/>
                             <a:ea typeface="Verdana" panose="020B0604030504040204" pitchFamily="34" charset="0"/>
@@ -10105,23 +10236,26 @@
                                 <m:sSub>
                                   <m:sSubPr>
                                     <m:ctrlPr>
-                                      <a:rPr lang="en-US" sz="1800">
+                                      <a:rPr lang="en-US" sz="1800" b="0" i="1">
                                         <a:effectLst/>
+                                        <a:latin typeface="Cambria Math" panose="02040503050406030204" pitchFamily="18" charset="0"/>
                                       </a:rPr>
                                     </m:ctrlPr>
                                   </m:sSubPr>
                                   <m:e>
                                     <m:r>
-                                      <a:rPr lang="en-US" sz="1800">
+                                      <a:rPr lang="en-US" sz="1800" b="0" i="1">
                                         <a:effectLst/>
+                                        <a:latin typeface="Cambria Math" panose="02040503050406030204" pitchFamily="18" charset="0"/>
                                       </a:rPr>
                                       <m:t>𝑤</m:t>
                                     </m:r>
                                   </m:e>
                                   <m:sub>
                                     <m:r>
-                                      <a:rPr lang="en-US" sz="1800">
+                                      <a:rPr lang="en-US" sz="1800" b="0" i="1">
                                         <a:effectLst/>
+                                        <a:latin typeface="Cambria Math" panose="02040503050406030204" pitchFamily="18" charset="0"/>
                                       </a:rPr>
                                       <m:t>𝑖𝑗</m:t>
                                     </m:r>
@@ -10130,7 +10264,7 @@
                               </m:oMath>
                             </m:oMathPara>
                           </a14:m>
-                          <a:endParaRPr lang="en-US" sz="1800">
+                          <a:endParaRPr lang="en-US" sz="1800" b="0">
                             <a:effectLst/>
                             <a:latin typeface="Verdana" panose="020B0604030504040204" pitchFamily="34" charset="0"/>
                             <a:ea typeface="Verdana" panose="020B0604030504040204" pitchFamily="34" charset="0"/>
@@ -10204,15 +10338,19 @@
                               </m:oMathParaPr>
                               <m:oMath xmlns:m="http://schemas.openxmlformats.org/officeDocument/2006/math">
                                 <m:r>
-                                  <a:rPr lang="en-US" sz="1800">
+                                  <m:rPr>
+                                    <m:sty m:val="p"/>
+                                  </m:rPr>
+                                  <a:rPr lang="en-US" sz="1800" b="0" i="1">
                                     <a:effectLst/>
+                                    <a:latin typeface="Cambria Math" panose="02040503050406030204" pitchFamily="18" charset="0"/>
                                   </a:rPr>
-                                  <m:t>𝜁</m:t>
+                                  <m:t>ζ</m:t>
                                 </m:r>
                               </m:oMath>
                             </m:oMathPara>
                           </a14:m>
-                          <a:endParaRPr lang="en-US" sz="1800">
+                          <a:endParaRPr lang="en-US" sz="1800" b="0">
                             <a:effectLst/>
                             <a:latin typeface="Verdana" panose="020B0604030504040204" pitchFamily="34" charset="0"/>
                             <a:ea typeface="Verdana" panose="020B0604030504040204" pitchFamily="34" charset="0"/>
@@ -10284,23 +10422,26 @@
                               <m:sSub>
                                 <m:sSubPr>
                                   <m:ctrlPr>
-                                    <a:rPr lang="en-US" sz="1800">
+                                    <a:rPr lang="en-US" sz="1800" b="0" i="1">
                                       <a:effectLst/>
+                                      <a:latin typeface="Cambria Math" panose="02040503050406030204" pitchFamily="18" charset="0"/>
                                     </a:rPr>
                                   </m:ctrlPr>
                                 </m:sSubPr>
                                 <m:e>
                                   <m:r>
-                                    <a:rPr lang="en-US" sz="1800">
+                                    <a:rPr lang="en-US" sz="1800" b="0" i="1">
                                       <a:effectLst/>
+                                      <a:latin typeface="Cambria Math" panose="02040503050406030204" pitchFamily="18" charset="0"/>
                                     </a:rPr>
                                     <m:t>𝑟</m:t>
                                   </m:r>
                                 </m:e>
                                 <m:sub>
                                   <m:r>
-                                    <a:rPr lang="en-US" sz="1800">
+                                    <a:rPr lang="en-US" sz="1800" b="0" i="1">
                                       <a:effectLst/>
+                                      <a:latin typeface="Cambria Math" panose="02040503050406030204" pitchFamily="18" charset="0"/>
                                     </a:rPr>
                                     <m:t>𝑎</m:t>
                                   </m:r>
@@ -10309,14 +10450,14 @@
                             </m:oMath>
                           </a14:m>
                           <a:r>
-                            <a:rPr lang="en-US" sz="1800">
+                            <a:rPr lang="en-US" sz="1800" b="0" dirty="0">
                               <a:effectLst/>
                               <a:latin typeface="Verdana" panose="020B0604030504040204" pitchFamily="34" charset="0"/>
                               <a:ea typeface="Verdana" panose="020B0604030504040204" pitchFamily="34" charset="0"/>
                             </a:rPr>
                             <a:t>(m)</a:t>
                           </a:r>
-                          <a:endParaRPr lang="en-US" sz="1800">
+                          <a:endParaRPr lang="en-US" sz="1800" b="0" dirty="0">
                             <a:effectLst/>
                             <a:latin typeface="Verdana" panose="020B0604030504040204" pitchFamily="34" charset="0"/>
                             <a:ea typeface="Verdana" panose="020B0604030504040204" pitchFamily="34" charset="0"/>
@@ -10387,7 +10528,7 @@
               <p:nvPr>
                 <p:extLst>
                   <p:ext uri="{D42A27DB-BD31-4B8C-83A1-F6EECF244321}">
-                    <p14:modId xmlns:p14="http://schemas.microsoft.com/office/powerpoint/2010/main" val="1152320968"/>
+                    <p14:modId xmlns:p14="http://schemas.microsoft.com/office/powerpoint/2010/main" val="301540686"/>
                   </p:ext>
                 </p:extLst>
               </p:nvPr>
@@ -10863,6 +11004,44 @@
           </p:graphicFrame>
         </mc:Fallback>
       </mc:AlternateContent>
+      <p:sp>
+        <p:nvSpPr>
+          <p:cNvPr id="7" name="TextBox 6">
+            <a:extLst>
+              <a:ext uri="{FF2B5EF4-FFF2-40B4-BE49-F238E27FC236}">
+                <a16:creationId xmlns:a16="http://schemas.microsoft.com/office/drawing/2014/main" id="{121354DF-7D82-40B3-80D1-43D50178D16F}"/>
+              </a:ext>
+            </a:extLst>
+          </p:cNvPr>
+          <p:cNvSpPr txBox="1"/>
+          <p:nvPr/>
+        </p:nvSpPr>
+        <p:spPr>
+          <a:xfrm>
+            <a:off x="4335541" y="4604852"/>
+            <a:ext cx="4110914" cy="369332"/>
+          </a:xfrm>
+          <a:prstGeom prst="rect">
+            <a:avLst/>
+          </a:prstGeom>
+          <a:noFill/>
+        </p:spPr>
+        <p:txBody>
+          <a:bodyPr wrap="square" rtlCol="0">
+            <a:spAutoFit/>
+          </a:bodyPr>
+          <a:lstStyle/>
+          <a:p>
+            <a:r>
+              <a:rPr lang="en-US" dirty="0">
+                <a:hlinkClick r:id="rId3"/>
+              </a:rPr>
+              <a:t>https://github.com/HN29/MPC_Planner</a:t>
+            </a:r>
+            <a:endParaRPr lang="en-US" dirty="0"/>
+          </a:p>
+        </p:txBody>
+      </p:sp>
     </p:spTree>
     <p:extLst>
       <p:ext uri="{BB962C8B-B14F-4D97-AF65-F5344CB8AC3E}">
@@ -14442,7 +14621,7 @@
         </p:nvSpPr>
         <p:spPr>
           <a:xfrm>
-            <a:off x="1371600" y="1266368"/>
+            <a:off x="1379858" y="1474435"/>
             <a:ext cx="1458686" cy="693420"/>
           </a:xfrm>
           <a:prstGeom prst="rightArrow">
@@ -14494,7 +14673,7 @@
         </p:nvSpPr>
         <p:spPr>
           <a:xfrm>
-            <a:off x="3138603" y="1289914"/>
+            <a:off x="3146861" y="1497981"/>
             <a:ext cx="5477691" cy="523220"/>
           </a:xfrm>
           <a:prstGeom prst="rect">
@@ -14554,137 +14733,13 @@
       </p:sp>
       <p:sp>
         <p:nvSpPr>
-          <p:cNvPr id="13" name="Right Arrow 12"/>
-          <p:cNvSpPr/>
-          <p:nvPr/>
-        </p:nvSpPr>
-        <p:spPr>
-          <a:xfrm>
-            <a:off x="1371600" y="2345466"/>
-            <a:ext cx="1458686" cy="693420"/>
-          </a:xfrm>
-          <a:prstGeom prst="rightArrow">
-            <a:avLst/>
-          </a:prstGeom>
-          <a:solidFill>
-            <a:srgbClr val="FF0000"/>
-          </a:solidFill>
-          <a:ln>
-            <a:solidFill>
-              <a:srgbClr val="FF0000"/>
-            </a:solidFill>
-          </a:ln>
-        </p:spPr>
-        <p:style>
-          <a:lnRef idx="2">
-            <a:schemeClr val="accent1">
-              <a:shade val="50000"/>
-            </a:schemeClr>
-          </a:lnRef>
-          <a:fillRef idx="1">
-            <a:schemeClr val="accent1"/>
-          </a:fillRef>
-          <a:effectRef idx="0">
-            <a:schemeClr val="accent1"/>
-          </a:effectRef>
-          <a:fontRef idx="minor">
-            <a:schemeClr val="lt1"/>
-          </a:fontRef>
-        </p:style>
-        <p:txBody>
-          <a:bodyPr rtlCol="0" anchor="ctr"/>
-          <a:lstStyle/>
-          <a:p>
-            <a:pPr algn="ctr"/>
-            <a:endParaRPr lang="en-US">
-              <a:solidFill>
-                <a:srgbClr val="9BB181"/>
-              </a:solidFill>
-              <a:latin typeface="Verdana" panose="020B0604030504040204" pitchFamily="34" charset="0"/>
-              <a:ea typeface="Verdana" panose="020B0604030504040204" pitchFamily="34" charset="0"/>
-              <a:cs typeface="Calibri" panose="020F0502020204030204" pitchFamily="34" charset="0"/>
-            </a:endParaRPr>
-          </a:p>
-        </p:txBody>
-      </p:sp>
-      <p:sp>
-        <p:nvSpPr>
-          <p:cNvPr id="14" name="TextBox 13"/>
-          <p:cNvSpPr txBox="1"/>
-          <p:nvPr/>
-        </p:nvSpPr>
-        <p:spPr>
-          <a:xfrm>
-            <a:off x="3132896" y="2445431"/>
-            <a:ext cx="5477691" cy="523220"/>
-          </a:xfrm>
-          <a:prstGeom prst="rect">
-            <a:avLst/>
-          </a:prstGeom>
-          <a:noFill/>
-        </p:spPr>
-        <p:txBody>
-          <a:bodyPr wrap="square" rtlCol="0">
-            <a:spAutoFit/>
-          </a:bodyPr>
-          <a:lstStyle/>
-          <a:p>
-            <a:r>
-              <a:rPr lang="en-US" sz="2800" dirty="0" err="1">
-                <a:solidFill>
-                  <a:srgbClr val="FF0000"/>
-                </a:solidFill>
-                <a:latin typeface="Verdana" panose="020B0604030504040204" pitchFamily="34" charset="0"/>
-                <a:ea typeface="Verdana" panose="020B0604030504040204" pitchFamily="34" charset="0"/>
-                <a:cs typeface="Calibri" panose="020F0502020204030204" pitchFamily="34" charset="0"/>
-              </a:rPr>
-              <a:t>Giải</a:t>
-            </a:r>
-            <a:r>
-              <a:rPr lang="en-US" sz="2800" dirty="0">
-                <a:solidFill>
-                  <a:srgbClr val="FF0000"/>
-                </a:solidFill>
-                <a:latin typeface="Verdana" panose="020B0604030504040204" pitchFamily="34" charset="0"/>
-                <a:ea typeface="Verdana" panose="020B0604030504040204" pitchFamily="34" charset="0"/>
-                <a:cs typeface="Calibri" panose="020F0502020204030204" pitchFamily="34" charset="0"/>
-              </a:rPr>
-              <a:t> </a:t>
-            </a:r>
-            <a:r>
-              <a:rPr lang="en-US" sz="2800" dirty="0" err="1">
-                <a:solidFill>
-                  <a:srgbClr val="FF0000"/>
-                </a:solidFill>
-                <a:latin typeface="Verdana" panose="020B0604030504040204" pitchFamily="34" charset="0"/>
-                <a:ea typeface="Verdana" panose="020B0604030504040204" pitchFamily="34" charset="0"/>
-                <a:cs typeface="Calibri" panose="020F0502020204030204" pitchFamily="34" charset="0"/>
-              </a:rPr>
-              <a:t>thuật</a:t>
-            </a:r>
-            <a:r>
-              <a:rPr lang="en-US" sz="2800" dirty="0">
-                <a:solidFill>
-                  <a:srgbClr val="FF0000"/>
-                </a:solidFill>
-                <a:latin typeface="Verdana" panose="020B0604030504040204" pitchFamily="34" charset="0"/>
-                <a:ea typeface="Verdana" panose="020B0604030504040204" pitchFamily="34" charset="0"/>
-                <a:cs typeface="Calibri" panose="020F0502020204030204" pitchFamily="34" charset="0"/>
-              </a:rPr>
-              <a:t> MPC</a:t>
-            </a:r>
-          </a:p>
-        </p:txBody>
-      </p:sp>
-      <p:sp>
-        <p:nvSpPr>
           <p:cNvPr id="15" name="Right Arrow 14"/>
           <p:cNvSpPr/>
           <p:nvPr/>
         </p:nvSpPr>
         <p:spPr>
           <a:xfrm>
-            <a:off x="1371600" y="3424564"/>
+            <a:off x="1371600" y="2503254"/>
             <a:ext cx="1458686" cy="693420"/>
           </a:xfrm>
           <a:prstGeom prst="rightArrow">
@@ -14743,7 +14798,7 @@
         </p:nvSpPr>
         <p:spPr>
           <a:xfrm>
-            <a:off x="3132896" y="3496209"/>
+            <a:off x="3132896" y="2574899"/>
             <a:ext cx="9059104" cy="523220"/>
           </a:xfrm>
           <a:prstGeom prst="rect">
@@ -14973,7 +15028,7 @@
         </p:nvSpPr>
         <p:spPr>
           <a:xfrm>
-            <a:off x="1371600" y="4503662"/>
+            <a:off x="1371600" y="3582352"/>
             <a:ext cx="1458686" cy="693420"/>
           </a:xfrm>
           <a:prstGeom prst="rightArrow">
@@ -15035,7 +15090,7 @@
         </p:nvSpPr>
         <p:spPr>
           <a:xfrm>
-            <a:off x="3132896" y="4543081"/>
+            <a:off x="3132896" y="3621771"/>
             <a:ext cx="9059104" cy="523220"/>
           </a:xfrm>
           <a:prstGeom prst="rect">
@@ -15058,7 +15113,7 @@
                 <a:ea typeface="Verdana" panose="020B0604030504040204" pitchFamily="34" charset="0"/>
                 <a:cs typeface="Calibri" panose="020F0502020204030204" pitchFamily="34" charset="0"/>
               </a:rPr>
-              <a:t>Thực</a:t>
+              <a:t>Kết</a:t>
             </a:r>
             <a:r>
               <a:rPr lang="en-US" sz="2800" dirty="0">
@@ -15080,107 +15135,16 @@
                 <a:ea typeface="Verdana" panose="020B0604030504040204" pitchFamily="34" charset="0"/>
                 <a:cs typeface="Calibri" panose="020F0502020204030204" pitchFamily="34" charset="0"/>
               </a:rPr>
-              <a:t>nghiệm</a:t>
-            </a:r>
-            <a:r>
-              <a:rPr lang="en-US" sz="2800" dirty="0">
-                <a:solidFill>
-                  <a:srgbClr val="7030A0"/>
-                </a:solidFill>
-                <a:latin typeface="Verdana" panose="020B0604030504040204" pitchFamily="34" charset="0"/>
-                <a:ea typeface="Verdana" panose="020B0604030504040204" pitchFamily="34" charset="0"/>
-                <a:cs typeface="Calibri" panose="020F0502020204030204" pitchFamily="34" charset="0"/>
-              </a:rPr>
-              <a:t> MPC </a:t>
-            </a:r>
-            <a:r>
-              <a:rPr lang="en-US" sz="2800" dirty="0" err="1">
-                <a:solidFill>
-                  <a:srgbClr val="7030A0"/>
-                </a:solidFill>
-                <a:latin typeface="Verdana" panose="020B0604030504040204" pitchFamily="34" charset="0"/>
-                <a:ea typeface="Verdana" panose="020B0604030504040204" pitchFamily="34" charset="0"/>
-                <a:cs typeface="Calibri" panose="020F0502020204030204" pitchFamily="34" charset="0"/>
-              </a:rPr>
-              <a:t>trên</a:t>
-            </a:r>
-            <a:r>
-              <a:rPr lang="en-US" sz="2800" dirty="0">
-                <a:solidFill>
-                  <a:srgbClr val="7030A0"/>
-                </a:solidFill>
-                <a:latin typeface="Verdana" panose="020B0604030504040204" pitchFamily="34" charset="0"/>
-                <a:ea typeface="Verdana" panose="020B0604030504040204" pitchFamily="34" charset="0"/>
-                <a:cs typeface="Calibri" panose="020F0502020204030204" pitchFamily="34" charset="0"/>
-              </a:rPr>
-              <a:t> </a:t>
-            </a:r>
-            <a:r>
-              <a:rPr lang="en-US" sz="2800" dirty="0" err="1">
-                <a:solidFill>
-                  <a:srgbClr val="7030A0"/>
-                </a:solidFill>
-                <a:latin typeface="Verdana" panose="020B0604030504040204" pitchFamily="34" charset="0"/>
-                <a:ea typeface="Verdana" panose="020B0604030504040204" pitchFamily="34" charset="0"/>
-                <a:cs typeface="Calibri" panose="020F0502020204030204" pitchFamily="34" charset="0"/>
-              </a:rPr>
-              <a:t>mô</a:t>
-            </a:r>
-            <a:r>
-              <a:rPr lang="en-US" sz="2800" dirty="0">
-                <a:solidFill>
-                  <a:srgbClr val="7030A0"/>
-                </a:solidFill>
-                <a:latin typeface="Verdana" panose="020B0604030504040204" pitchFamily="34" charset="0"/>
-                <a:ea typeface="Verdana" panose="020B0604030504040204" pitchFamily="34" charset="0"/>
-                <a:cs typeface="Calibri" panose="020F0502020204030204" pitchFamily="34" charset="0"/>
-              </a:rPr>
-              <a:t> </a:t>
-            </a:r>
-            <a:r>
-              <a:rPr lang="en-US" sz="2800" dirty="0" err="1">
-                <a:solidFill>
-                  <a:srgbClr val="7030A0"/>
-                </a:solidFill>
-                <a:latin typeface="Verdana" panose="020B0604030504040204" pitchFamily="34" charset="0"/>
-                <a:ea typeface="Verdana" panose="020B0604030504040204" pitchFamily="34" charset="0"/>
-                <a:cs typeface="Calibri" panose="020F0502020204030204" pitchFamily="34" charset="0"/>
-              </a:rPr>
-              <a:t>hình</a:t>
-            </a:r>
-            <a:r>
-              <a:rPr lang="en-US" sz="2800" dirty="0">
-                <a:solidFill>
-                  <a:srgbClr val="7030A0"/>
-                </a:solidFill>
-                <a:latin typeface="Verdana" panose="020B0604030504040204" pitchFamily="34" charset="0"/>
-                <a:ea typeface="Verdana" panose="020B0604030504040204" pitchFamily="34" charset="0"/>
-                <a:cs typeface="Calibri" panose="020F0502020204030204" pitchFamily="34" charset="0"/>
-              </a:rPr>
-              <a:t> </a:t>
-            </a:r>
-            <a:r>
-              <a:rPr lang="en-US" sz="2800" dirty="0" err="1">
-                <a:solidFill>
-                  <a:srgbClr val="7030A0"/>
-                </a:solidFill>
-                <a:latin typeface="Verdana" panose="020B0604030504040204" pitchFamily="34" charset="0"/>
-                <a:ea typeface="Verdana" panose="020B0604030504040204" pitchFamily="34" charset="0"/>
-                <a:cs typeface="Calibri" panose="020F0502020204030204" pitchFamily="34" charset="0"/>
-              </a:rPr>
-              <a:t>Turtlebot</a:t>
-            </a:r>
-            <a:r>
-              <a:rPr lang="en-US" sz="2800" dirty="0">
-                <a:solidFill>
-                  <a:srgbClr val="7030A0"/>
-                </a:solidFill>
-                <a:latin typeface="Verdana" panose="020B0604030504040204" pitchFamily="34" charset="0"/>
-                <a:ea typeface="Verdana" panose="020B0604030504040204" pitchFamily="34" charset="0"/>
-                <a:cs typeface="Calibri" panose="020F0502020204030204" pitchFamily="34" charset="0"/>
-              </a:rPr>
-              <a:t> 3</a:t>
-            </a:r>
+              <a:t>quả</a:t>
+            </a:r>
+            <a:endParaRPr lang="en-US" sz="2800" dirty="0">
+              <a:solidFill>
+                <a:srgbClr val="7030A0"/>
+              </a:solidFill>
+              <a:latin typeface="Verdana" panose="020B0604030504040204" pitchFamily="34" charset="0"/>
+              <a:ea typeface="Verdana" panose="020B0604030504040204" pitchFamily="34" charset="0"/>
+              <a:cs typeface="Calibri" panose="020F0502020204030204" pitchFamily="34" charset="0"/>
+            </a:endParaRPr>
           </a:p>
         </p:txBody>
       </p:sp>
@@ -15262,7 +15226,7 @@
         </p:nvSpPr>
         <p:spPr>
           <a:xfrm>
-            <a:off x="1379858" y="5659179"/>
+            <a:off x="1379858" y="4622031"/>
             <a:ext cx="1458686" cy="693420"/>
           </a:xfrm>
           <a:prstGeom prst="rightArrow">
@@ -15328,7 +15292,7 @@
         </p:nvSpPr>
         <p:spPr>
           <a:xfrm>
-            <a:off x="3141154" y="5698598"/>
+            <a:off x="3141154" y="4661450"/>
             <a:ext cx="9059104" cy="523220"/>
           </a:xfrm>
           <a:prstGeom prst="rect">
@@ -20868,8 +20832,8 @@
           </a:p>
         </p:txBody>
       </p:sp>
-      <mc:AlternateContent xmlns:mc="http://schemas.openxmlformats.org/markup-compatibility/2006">
-        <mc:Choice xmlns:a14="http://schemas.microsoft.com/office/drawing/2010/main" Requires="a14">
+      <mc:AlternateContent xmlns:mc="http://schemas.openxmlformats.org/markup-compatibility/2006" xmlns:a14="http://schemas.microsoft.com/office/drawing/2010/main">
+        <mc:Choice Requires="a14">
           <p:sp>
             <p:nvSpPr>
               <p:cNvPr id="14" name="TextBox 13">
@@ -21111,7 +21075,7 @@
             </p:txBody>
           </p:sp>
         </mc:Choice>
-        <mc:Fallback>
+        <mc:Fallback xmlns="">
           <p:sp>
             <p:nvSpPr>
               <p:cNvPr id="14" name="TextBox 13">
@@ -21156,8 +21120,8 @@
           </p:sp>
         </mc:Fallback>
       </mc:AlternateContent>
-      <mc:AlternateContent xmlns:mc="http://schemas.openxmlformats.org/markup-compatibility/2006">
-        <mc:Choice xmlns:a14="http://schemas.microsoft.com/office/drawing/2010/main" Requires="a14">
+      <mc:AlternateContent xmlns:mc="http://schemas.openxmlformats.org/markup-compatibility/2006" xmlns:a14="http://schemas.microsoft.com/office/drawing/2010/main">
+        <mc:Choice Requires="a14">
           <p:sp>
             <p:nvSpPr>
               <p:cNvPr id="3" name="TextBox 2">
@@ -21186,6 +21150,7 @@
               </a:bodyPr>
               <a:lstStyle/>
               <a:p>
+                <a:pPr/>
                 <a14:m>
                   <m:oMathPara xmlns:m="http://schemas.openxmlformats.org/officeDocument/2006/math">
                     <m:oMathParaPr>
@@ -21492,7 +21457,7 @@
             </p:txBody>
           </p:sp>
         </mc:Choice>
-        <mc:Fallback>
+        <mc:Fallback xmlns="">
           <p:sp>
             <p:nvSpPr>
               <p:cNvPr id="3" name="TextBox 2">
@@ -21537,8 +21502,8 @@
           </p:sp>
         </mc:Fallback>
       </mc:AlternateContent>
-      <mc:AlternateContent xmlns:mc="http://schemas.openxmlformats.org/markup-compatibility/2006">
-        <mc:Choice xmlns:a14="http://schemas.microsoft.com/office/drawing/2010/main" Requires="a14">
+      <mc:AlternateContent xmlns:mc="http://schemas.openxmlformats.org/markup-compatibility/2006" xmlns:a14="http://schemas.microsoft.com/office/drawing/2010/main">
+        <mc:Choice Requires="a14">
           <p:sp>
             <p:nvSpPr>
               <p:cNvPr id="8" name="TextBox 7">
@@ -21572,24 +21537,32 @@
                     <m:sSub>
                       <m:sSubPr>
                         <m:ctrlPr>
-                          <a:rPr lang="en-US" i="1" smtClean="0"/>
+                          <a:rPr lang="en-US" i="1" smtClean="0">
+                            <a:latin typeface="Cambria Math" panose="02040503050406030204" pitchFamily="18" charset="0"/>
+                          </a:rPr>
                         </m:ctrlPr>
                       </m:sSubPr>
                       <m:e>
                         <m:r>
-                          <a:rPr lang="en-US" i="1"/>
+                          <a:rPr lang="en-US" i="1">
+                            <a:latin typeface="Cambria Math" panose="02040503050406030204" pitchFamily="18" charset="0"/>
+                          </a:rPr>
                           <m:t>𝜔</m:t>
                         </m:r>
                       </m:e>
                       <m:sub>
                         <m:r>
-                          <a:rPr lang="en-US" i="1"/>
+                          <a:rPr lang="en-US" i="1">
+                            <a:latin typeface="Cambria Math" panose="02040503050406030204" pitchFamily="18" charset="0"/>
+                          </a:rPr>
                           <m:t>𝑅</m:t>
                         </m:r>
                       </m:sub>
                     </m:sSub>
                     <m:r>
-                      <a:rPr lang="en-US" i="1"/>
+                      <a:rPr lang="en-US" i="1">
+                        <a:latin typeface="Cambria Math" panose="02040503050406030204" pitchFamily="18" charset="0"/>
+                      </a:rPr>
                       <m:t>= </m:t>
                     </m:r>
                     <m:d>
@@ -21627,62 +21600,84 @@
                       </m:e>
                     </m:d>
                     <m:r>
-                      <a:rPr lang="en-US" i="1"/>
+                      <a:rPr lang="en-US" i="1">
+                        <a:latin typeface="Cambria Math" panose="02040503050406030204" pitchFamily="18" charset="0"/>
+                      </a:rPr>
                       <m:t>+ </m:t>
                     </m:r>
                     <m:r>
-                      <a:rPr lang="en-US" i="1"/>
+                      <a:rPr lang="en-US" i="1">
+                        <a:latin typeface="Cambria Math" panose="02040503050406030204" pitchFamily="18" charset="0"/>
+                      </a:rPr>
                       <m:t>𝜁</m:t>
                     </m:r>
                     <m:f>
                       <m:fPr>
                         <m:ctrlPr>
-                          <a:rPr lang="en-US" i="1"/>
+                          <a:rPr lang="en-US" i="1">
+                            <a:latin typeface="Cambria Math" panose="02040503050406030204" pitchFamily="18" charset="0"/>
+                          </a:rPr>
                         </m:ctrlPr>
                       </m:fPr>
                       <m:num>
                         <m:sSub>
                           <m:sSubPr>
                             <m:ctrlPr>
-                              <a:rPr lang="en-US" i="1"/>
+                              <a:rPr lang="en-US" i="1">
+                                <a:latin typeface="Cambria Math" panose="02040503050406030204" pitchFamily="18" charset="0"/>
+                              </a:rPr>
                             </m:ctrlPr>
                           </m:sSubPr>
                           <m:e>
                             <m:r>
-                              <a:rPr lang="en-US" i="1"/>
+                              <a:rPr lang="en-US" i="1">
+                                <a:latin typeface="Cambria Math" panose="02040503050406030204" pitchFamily="18" charset="0"/>
+                              </a:rPr>
                               <m:t>𝜃</m:t>
                             </m:r>
                           </m:e>
                           <m:sub>
                             <m:r>
-                              <a:rPr lang="en-US" i="1"/>
+                              <a:rPr lang="en-US" i="1">
+                                <a:latin typeface="Cambria Math" panose="02040503050406030204" pitchFamily="18" charset="0"/>
+                              </a:rPr>
                               <m:t>𝑡</m:t>
                             </m:r>
                             <m:r>
-                              <a:rPr lang="en-US" i="1"/>
+                              <a:rPr lang="en-US" i="1">
+                                <a:latin typeface="Cambria Math" panose="02040503050406030204" pitchFamily="18" charset="0"/>
+                              </a:rPr>
                               <m:t>+1</m:t>
                             </m:r>
                           </m:sub>
                         </m:sSub>
                         <m:r>
-                          <a:rPr lang="en-US" i="1"/>
+                          <a:rPr lang="en-US" i="1">
+                            <a:latin typeface="Cambria Math" panose="02040503050406030204" pitchFamily="18" charset="0"/>
+                          </a:rPr>
                           <m:t>−</m:t>
                         </m:r>
                         <m:sSub>
                           <m:sSubPr>
                             <m:ctrlPr>
-                              <a:rPr lang="en-US" i="1"/>
+                              <a:rPr lang="en-US" i="1">
+                                <a:latin typeface="Cambria Math" panose="02040503050406030204" pitchFamily="18" charset="0"/>
+                              </a:rPr>
                             </m:ctrlPr>
                           </m:sSubPr>
                           <m:e>
                             <m:r>
-                              <a:rPr lang="en-US" i="1"/>
+                              <a:rPr lang="en-US" i="1">
+                                <a:latin typeface="Cambria Math" panose="02040503050406030204" pitchFamily="18" charset="0"/>
+                              </a:rPr>
                               <m:t>𝜃</m:t>
                             </m:r>
                           </m:e>
                           <m:sub>
                             <m:r>
-                              <a:rPr lang="en-US" i="1"/>
+                              <a:rPr lang="en-US" i="1">
+                                <a:latin typeface="Cambria Math" panose="02040503050406030204" pitchFamily="18" charset="0"/>
+                              </a:rPr>
                               <m:t>𝑡</m:t>
                             </m:r>
                           </m:sub>
@@ -21693,11 +21688,15 @@
                           <m:rPr>
                             <m:sty m:val="p"/>
                           </m:rPr>
-                          <a:rPr lang="en-US"/>
+                          <a:rPr lang="en-US">
+                            <a:latin typeface="Cambria Math" panose="02040503050406030204" pitchFamily="18" charset="0"/>
+                          </a:rPr>
                           <m:t>Δ</m:t>
                         </m:r>
                         <m:r>
-                          <a:rPr lang="en-US" i="1"/>
+                          <a:rPr lang="en-US" i="1">
+                            <a:latin typeface="Cambria Math" panose="02040503050406030204" pitchFamily="18" charset="0"/>
+                          </a:rPr>
                           <m:t>𝑡</m:t>
                         </m:r>
                       </m:den>
@@ -21719,7 +21718,7 @@
             </p:txBody>
           </p:sp>
         </mc:Choice>
-        <mc:Fallback>
+        <mc:Fallback xmlns="">
           <p:sp>
             <p:nvSpPr>
               <p:cNvPr id="8" name="TextBox 7">
@@ -21764,8 +21763,8 @@
           </p:sp>
         </mc:Fallback>
       </mc:AlternateContent>
-      <mc:AlternateContent xmlns:mc="http://schemas.openxmlformats.org/markup-compatibility/2006">
-        <mc:Choice xmlns:a14="http://schemas.microsoft.com/office/drawing/2010/main" Requires="a14">
+      <mc:AlternateContent xmlns:mc="http://schemas.openxmlformats.org/markup-compatibility/2006" xmlns:a14="http://schemas.microsoft.com/office/drawing/2010/main">
+        <mc:Choice Requires="a14">
           <p:sp>
             <p:nvSpPr>
               <p:cNvPr id="11" name="TextBox 10">
@@ -21794,6 +21793,7 @@
               </a:bodyPr>
               <a:lstStyle/>
               <a:p>
+                <a:pPr/>
                 <a14:m>
                   <m:oMathPara xmlns:m="http://schemas.openxmlformats.org/officeDocument/2006/math">
                     <m:oMathParaPr>
@@ -21972,7 +21972,7 @@
             </p:txBody>
           </p:sp>
         </mc:Choice>
-        <mc:Fallback>
+        <mc:Fallback xmlns="">
           <p:sp>
             <p:nvSpPr>
               <p:cNvPr id="11" name="TextBox 10">
@@ -22376,566 +22376,133 @@
           </a:prstGeom>
         </p:spPr>
       </p:pic>
+      <p:sp>
+        <p:nvSpPr>
+          <p:cNvPr id="9" name="TextBox 8">
+            <a:extLst>
+              <a:ext uri="{FF2B5EF4-FFF2-40B4-BE49-F238E27FC236}">
+                <a16:creationId xmlns:a16="http://schemas.microsoft.com/office/drawing/2014/main" id="{94226255-64FE-A5E6-6464-5D6B780E2C15}"/>
+              </a:ext>
+            </a:extLst>
+          </p:cNvPr>
+          <p:cNvSpPr txBox="1"/>
+          <p:nvPr/>
+        </p:nvSpPr>
+        <p:spPr>
+          <a:xfrm>
+            <a:off x="1409928" y="4834851"/>
+            <a:ext cx="5156201" cy="369332"/>
+          </a:xfrm>
+          <a:prstGeom prst="rect">
+            <a:avLst/>
+          </a:prstGeom>
+          <a:noFill/>
+        </p:spPr>
+        <p:txBody>
+          <a:bodyPr wrap="square" rtlCol="0">
+            <a:spAutoFit/>
+          </a:bodyPr>
+          <a:lstStyle/>
+          <a:p>
+            <a:pPr marL="285750" indent="-285750">
+              <a:buFont typeface="Wingdings" panose="05000000000000000000" pitchFamily="2" charset="2"/>
+              <a:buChar char="q"/>
+            </a:pPr>
+            <a:r>
+              <a:rPr lang="en-US" dirty="0">
+                <a:solidFill>
+                  <a:schemeClr val="tx2"/>
+                </a:solidFill>
+                <a:latin typeface="Verdana" panose="020B0604030504040204" pitchFamily="34" charset="0"/>
+                <a:ea typeface="Verdana" panose="020B0604030504040204" pitchFamily="34" charset="0"/>
+              </a:rPr>
+              <a:t>Tối </a:t>
+            </a:r>
+            <a:r>
+              <a:rPr lang="en-US" dirty="0" err="1">
+                <a:solidFill>
+                  <a:schemeClr val="tx2"/>
+                </a:solidFill>
+                <a:latin typeface="Verdana" panose="020B0604030504040204" pitchFamily="34" charset="0"/>
+                <a:ea typeface="Verdana" panose="020B0604030504040204" pitchFamily="34" charset="0"/>
+              </a:rPr>
+              <a:t>thiểu</a:t>
+            </a:r>
+            <a:r>
+              <a:rPr lang="en-US" dirty="0">
+                <a:solidFill>
+                  <a:schemeClr val="tx2"/>
+                </a:solidFill>
+                <a:latin typeface="Verdana" panose="020B0604030504040204" pitchFamily="34" charset="0"/>
+                <a:ea typeface="Verdana" panose="020B0604030504040204" pitchFamily="34" charset="0"/>
+              </a:rPr>
+              <a:t> </a:t>
+            </a:r>
+            <a:r>
+              <a:rPr lang="en-US" dirty="0" err="1">
+                <a:solidFill>
+                  <a:schemeClr val="tx2"/>
+                </a:solidFill>
+                <a:latin typeface="Verdana" panose="020B0604030504040204" pitchFamily="34" charset="0"/>
+                <a:ea typeface="Verdana" panose="020B0604030504040204" pitchFamily="34" charset="0"/>
+              </a:rPr>
+              <a:t>hóa</a:t>
+            </a:r>
+            <a:r>
+              <a:rPr lang="en-US" dirty="0">
+                <a:solidFill>
+                  <a:schemeClr val="tx2"/>
+                </a:solidFill>
+                <a:latin typeface="Verdana" panose="020B0604030504040204" pitchFamily="34" charset="0"/>
+                <a:ea typeface="Verdana" panose="020B0604030504040204" pitchFamily="34" charset="0"/>
+              </a:rPr>
+              <a:t> </a:t>
+            </a:r>
+            <a:r>
+              <a:rPr lang="en-US" dirty="0" err="1">
+                <a:solidFill>
+                  <a:schemeClr val="tx2"/>
+                </a:solidFill>
+                <a:latin typeface="Verdana" panose="020B0604030504040204" pitchFamily="34" charset="0"/>
+                <a:ea typeface="Verdana" panose="020B0604030504040204" pitchFamily="34" charset="0"/>
+              </a:rPr>
+              <a:t>hàm</a:t>
+            </a:r>
+            <a:r>
+              <a:rPr lang="en-US" dirty="0">
+                <a:solidFill>
+                  <a:schemeClr val="tx2"/>
+                </a:solidFill>
+                <a:latin typeface="Verdana" panose="020B0604030504040204" pitchFamily="34" charset="0"/>
+                <a:ea typeface="Verdana" panose="020B0604030504040204" pitchFamily="34" charset="0"/>
+              </a:rPr>
+              <a:t> chi </a:t>
+            </a:r>
+            <a:r>
+              <a:rPr lang="en-US" dirty="0" err="1">
+                <a:solidFill>
+                  <a:schemeClr val="tx2"/>
+                </a:solidFill>
+                <a:latin typeface="Verdana" panose="020B0604030504040204" pitchFamily="34" charset="0"/>
+                <a:ea typeface="Verdana" panose="020B0604030504040204" pitchFamily="34" charset="0"/>
+              </a:rPr>
+              <a:t>phí</a:t>
+            </a:r>
+            <a:r>
+              <a:rPr lang="en-US" dirty="0">
+                <a:solidFill>
+                  <a:schemeClr val="tx2"/>
+                </a:solidFill>
+                <a:latin typeface="Verdana" panose="020B0604030504040204" pitchFamily="34" charset="0"/>
+                <a:ea typeface="Verdana" panose="020B0604030504040204" pitchFamily="34" charset="0"/>
+              </a:rPr>
+              <a:t>:</a:t>
+            </a:r>
+          </a:p>
+        </p:txBody>
+      </p:sp>
       <mc:AlternateContent xmlns:mc="http://schemas.openxmlformats.org/markup-compatibility/2006" xmlns:a14="http://schemas.microsoft.com/office/drawing/2010/main">
         <mc:Choice Requires="a14">
-          <p:sp>
-            <p:nvSpPr>
-              <p:cNvPr id="9" name="TextBox 8">
-                <a:extLst>
-                  <a:ext uri="{FF2B5EF4-FFF2-40B4-BE49-F238E27FC236}">
-                    <a16:creationId xmlns:a16="http://schemas.microsoft.com/office/drawing/2014/main" id="{94226255-64FE-A5E6-6464-5D6B780E2C15}"/>
-                  </a:ext>
-                </a:extLst>
-              </p:cNvPr>
-              <p:cNvSpPr txBox="1"/>
-              <p:nvPr/>
-            </p:nvSpPr>
-            <p:spPr>
-              <a:xfrm>
-                <a:off x="1244599" y="2253343"/>
-                <a:ext cx="5156201" cy="2330574"/>
-              </a:xfrm>
-              <a:prstGeom prst="rect">
-                <a:avLst/>
-              </a:prstGeom>
-              <a:noFill/>
-            </p:spPr>
-            <p:txBody>
-              <a:bodyPr wrap="square" rtlCol="0">
-                <a:spAutoFit/>
-              </a:bodyPr>
-              <a:lstStyle/>
-              <a:p>
-                <a:pPr marL="285750" indent="-285750">
-                  <a:buFont typeface="Wingdings" panose="05000000000000000000" pitchFamily="2" charset="2"/>
-                  <a:buChar char="q"/>
-                </a:pPr>
-                <a:r>
-                  <a:rPr lang="en-US" dirty="0">
-                    <a:solidFill>
-                      <a:schemeClr val="tx2"/>
-                    </a:solidFill>
-                    <a:latin typeface="Verdana" panose="020B0604030504040204" pitchFamily="34" charset="0"/>
-                    <a:ea typeface="Verdana" panose="020B0604030504040204" pitchFamily="34" charset="0"/>
-                  </a:rPr>
-                  <a:t>Tối </a:t>
-                </a:r>
-                <a:r>
-                  <a:rPr lang="en-US" dirty="0" err="1">
-                    <a:solidFill>
-                      <a:schemeClr val="tx2"/>
-                    </a:solidFill>
-                    <a:latin typeface="Verdana" panose="020B0604030504040204" pitchFamily="34" charset="0"/>
-                    <a:ea typeface="Verdana" panose="020B0604030504040204" pitchFamily="34" charset="0"/>
-                  </a:rPr>
-                  <a:t>thiểu</a:t>
-                </a:r>
-                <a:r>
-                  <a:rPr lang="en-US" dirty="0">
-                    <a:solidFill>
-                      <a:schemeClr val="tx2"/>
-                    </a:solidFill>
-                    <a:latin typeface="Verdana" panose="020B0604030504040204" pitchFamily="34" charset="0"/>
-                    <a:ea typeface="Verdana" panose="020B0604030504040204" pitchFamily="34" charset="0"/>
-                  </a:rPr>
-                  <a:t> </a:t>
-                </a:r>
-                <a:r>
-                  <a:rPr lang="en-US" dirty="0" err="1">
-                    <a:solidFill>
-                      <a:schemeClr val="tx2"/>
-                    </a:solidFill>
-                    <a:latin typeface="Verdana" panose="020B0604030504040204" pitchFamily="34" charset="0"/>
-                    <a:ea typeface="Verdana" panose="020B0604030504040204" pitchFamily="34" charset="0"/>
-                  </a:rPr>
-                  <a:t>hóa</a:t>
-                </a:r>
-                <a:r>
-                  <a:rPr lang="en-US" dirty="0">
-                    <a:solidFill>
-                      <a:schemeClr val="tx2"/>
-                    </a:solidFill>
-                    <a:latin typeface="Verdana" panose="020B0604030504040204" pitchFamily="34" charset="0"/>
-                    <a:ea typeface="Verdana" panose="020B0604030504040204" pitchFamily="34" charset="0"/>
-                  </a:rPr>
-                  <a:t> </a:t>
-                </a:r>
-                <a:r>
-                  <a:rPr lang="en-US" dirty="0" err="1">
-                    <a:solidFill>
-                      <a:schemeClr val="tx2"/>
-                    </a:solidFill>
-                    <a:latin typeface="Verdana" panose="020B0604030504040204" pitchFamily="34" charset="0"/>
-                    <a:ea typeface="Verdana" panose="020B0604030504040204" pitchFamily="34" charset="0"/>
-                  </a:rPr>
-                  <a:t>hàm</a:t>
-                </a:r>
-                <a:r>
-                  <a:rPr lang="en-US" dirty="0">
-                    <a:solidFill>
-                      <a:schemeClr val="tx2"/>
-                    </a:solidFill>
-                    <a:latin typeface="Verdana" panose="020B0604030504040204" pitchFamily="34" charset="0"/>
-                    <a:ea typeface="Verdana" panose="020B0604030504040204" pitchFamily="34" charset="0"/>
-                  </a:rPr>
-                  <a:t> chi </a:t>
-                </a:r>
-                <a:r>
-                  <a:rPr lang="en-US" dirty="0" err="1">
-                    <a:solidFill>
-                      <a:schemeClr val="tx2"/>
-                    </a:solidFill>
-                    <a:latin typeface="Verdana" panose="020B0604030504040204" pitchFamily="34" charset="0"/>
-                    <a:ea typeface="Verdana" panose="020B0604030504040204" pitchFamily="34" charset="0"/>
-                  </a:rPr>
-                  <a:t>phí</a:t>
-                </a:r>
-                <a:r>
-                  <a:rPr lang="en-US" dirty="0">
-                    <a:solidFill>
-                      <a:schemeClr val="tx2"/>
-                    </a:solidFill>
-                    <a:latin typeface="Verdana" panose="020B0604030504040204" pitchFamily="34" charset="0"/>
-                    <a:ea typeface="Verdana" panose="020B0604030504040204" pitchFamily="34" charset="0"/>
-                  </a:rPr>
-                  <a:t>:</a:t>
-                </a:r>
-              </a:p>
-              <a:p>
-                <a:pPr marL="285750" indent="-285750">
-                  <a:buFont typeface="Wingdings" panose="05000000000000000000" pitchFamily="2" charset="2"/>
-                  <a:buChar char="q"/>
-                </a:pPr>
-                <a:endParaRPr lang="en-US" dirty="0">
-                  <a:solidFill>
-                    <a:schemeClr val="tx2"/>
-                  </a:solidFill>
-                  <a:latin typeface="Verdana" panose="020B0604030504040204" pitchFamily="34" charset="0"/>
-                  <a:ea typeface="Verdana" panose="020B0604030504040204" pitchFamily="34" charset="0"/>
-                </a:endParaRPr>
-              </a:p>
-              <a:p>
-                <a:endParaRPr lang="en-US" dirty="0">
-                  <a:solidFill>
-                    <a:schemeClr val="tx2"/>
-                  </a:solidFill>
-                  <a:latin typeface="Verdana" panose="020B0604030504040204" pitchFamily="34" charset="0"/>
-                  <a:ea typeface="Verdana" panose="020B0604030504040204" pitchFamily="34" charset="0"/>
-                </a:endParaRPr>
-              </a:p>
-              <a:p>
-                <a:pPr marL="742950" lvl="1" indent="-285750">
-                  <a:buFont typeface="Wingdings" panose="05000000000000000000" pitchFamily="2" charset="2"/>
-                  <a:buChar char="Ø"/>
-                </a:pPr>
-                <a14:m>
-                  <m:oMath xmlns:m="http://schemas.openxmlformats.org/officeDocument/2006/math">
-                    <m:sSub>
-                      <m:sSubPr>
-                        <m:ctrlPr>
-                          <a:rPr lang="en-US" b="0" i="1" smtClean="0">
-                            <a:solidFill>
-                              <a:schemeClr val="tx2"/>
-                            </a:solidFill>
-                            <a:latin typeface="Cambria Math" panose="02040503050406030204" pitchFamily="18" charset="0"/>
-                            <a:ea typeface="Verdana" panose="020B0604030504040204" pitchFamily="34" charset="0"/>
-                          </a:rPr>
-                        </m:ctrlPr>
-                      </m:sSubPr>
-                      <m:e>
-                        <m:r>
-                          <a:rPr lang="en-US" b="0" i="1" smtClean="0">
-                            <a:solidFill>
-                              <a:schemeClr val="tx2"/>
-                            </a:solidFill>
-                            <a:latin typeface="Cambria Math" panose="02040503050406030204" pitchFamily="18" charset="0"/>
-                            <a:ea typeface="Verdana" panose="020B0604030504040204" pitchFamily="34" charset="0"/>
-                          </a:rPr>
-                          <m:t>𝐽</m:t>
-                        </m:r>
-                      </m:e>
-                      <m:sub>
-                        <m:r>
-                          <a:rPr lang="en-US" b="0" i="1" smtClean="0">
-                            <a:solidFill>
-                              <a:schemeClr val="tx2"/>
-                            </a:solidFill>
-                            <a:latin typeface="Cambria Math" panose="02040503050406030204" pitchFamily="18" charset="0"/>
-                            <a:ea typeface="Verdana" panose="020B0604030504040204" pitchFamily="34" charset="0"/>
-                          </a:rPr>
-                          <m:t>𝑓</m:t>
-                        </m:r>
-                      </m:sub>
-                    </m:sSub>
-                    <m:r>
-                      <a:rPr lang="en-US" b="0" i="1" smtClean="0">
-                        <a:solidFill>
-                          <a:schemeClr val="tx2"/>
-                        </a:solidFill>
-                        <a:latin typeface="Cambria Math" panose="02040503050406030204" pitchFamily="18" charset="0"/>
-                        <a:ea typeface="Verdana" panose="020B0604030504040204" pitchFamily="34" charset="0"/>
-                      </a:rPr>
-                      <m:t>:</m:t>
-                    </m:r>
-                  </m:oMath>
-                </a14:m>
-                <a:r>
-                  <a:rPr lang="en-US" dirty="0">
-                    <a:solidFill>
-                      <a:schemeClr val="tx2"/>
-                    </a:solidFill>
-                    <a:latin typeface="Verdana" panose="020B0604030504040204" pitchFamily="34" charset="0"/>
-                    <a:ea typeface="Verdana" panose="020B0604030504040204" pitchFamily="34" charset="0"/>
-                  </a:rPr>
-                  <a:t> Sai </a:t>
-                </a:r>
-                <a:r>
-                  <a:rPr lang="en-US" dirty="0" err="1">
-                    <a:solidFill>
-                      <a:schemeClr val="tx2"/>
-                    </a:solidFill>
-                    <a:latin typeface="Verdana" panose="020B0604030504040204" pitchFamily="34" charset="0"/>
-                    <a:ea typeface="Verdana" panose="020B0604030504040204" pitchFamily="34" charset="0"/>
-                  </a:rPr>
-                  <a:t>số</a:t>
-                </a:r>
-                <a:r>
-                  <a:rPr lang="en-US" dirty="0">
-                    <a:solidFill>
-                      <a:schemeClr val="tx2"/>
-                    </a:solidFill>
-                    <a:latin typeface="Verdana" panose="020B0604030504040204" pitchFamily="34" charset="0"/>
-                    <a:ea typeface="Verdana" panose="020B0604030504040204" pitchFamily="34" charset="0"/>
-                  </a:rPr>
-                  <a:t> </a:t>
-                </a:r>
-                <a:r>
-                  <a:rPr lang="en-US" dirty="0" err="1">
-                    <a:solidFill>
-                      <a:schemeClr val="tx2"/>
-                    </a:solidFill>
-                    <a:latin typeface="Verdana" panose="020B0604030504040204" pitchFamily="34" charset="0"/>
-                    <a:ea typeface="Verdana" panose="020B0604030504040204" pitchFamily="34" charset="0"/>
-                  </a:rPr>
-                  <a:t>tại</a:t>
-                </a:r>
-                <a:r>
-                  <a:rPr lang="en-US" dirty="0">
-                    <a:solidFill>
-                      <a:schemeClr val="tx2"/>
-                    </a:solidFill>
-                    <a:latin typeface="Verdana" panose="020B0604030504040204" pitchFamily="34" charset="0"/>
-                    <a:ea typeface="Verdana" panose="020B0604030504040204" pitchFamily="34" charset="0"/>
-                  </a:rPr>
-                  <a:t> </a:t>
-                </a:r>
-                <a:r>
-                  <a:rPr lang="en-US" dirty="0" err="1">
-                    <a:solidFill>
-                      <a:schemeClr val="tx2"/>
-                    </a:solidFill>
-                    <a:latin typeface="Verdana" panose="020B0604030504040204" pitchFamily="34" charset="0"/>
-                    <a:ea typeface="Verdana" panose="020B0604030504040204" pitchFamily="34" charset="0"/>
-                  </a:rPr>
-                  <a:t>điểm</a:t>
-                </a:r>
-                <a:r>
-                  <a:rPr lang="en-US" dirty="0">
-                    <a:solidFill>
-                      <a:schemeClr val="tx2"/>
-                    </a:solidFill>
-                    <a:latin typeface="Verdana" panose="020B0604030504040204" pitchFamily="34" charset="0"/>
-                    <a:ea typeface="Verdana" panose="020B0604030504040204" pitchFamily="34" charset="0"/>
-                  </a:rPr>
-                  <a:t> </a:t>
-                </a:r>
-                <a:r>
-                  <a:rPr lang="en-US" dirty="0" err="1">
-                    <a:solidFill>
-                      <a:schemeClr val="tx2"/>
-                    </a:solidFill>
-                    <a:latin typeface="Verdana" panose="020B0604030504040204" pitchFamily="34" charset="0"/>
-                    <a:ea typeface="Verdana" panose="020B0604030504040204" pitchFamily="34" charset="0"/>
-                  </a:rPr>
-                  <a:t>mục</a:t>
-                </a:r>
-                <a:r>
-                  <a:rPr lang="en-US" dirty="0">
-                    <a:solidFill>
-                      <a:schemeClr val="tx2"/>
-                    </a:solidFill>
-                    <a:latin typeface="Verdana" panose="020B0604030504040204" pitchFamily="34" charset="0"/>
-                    <a:ea typeface="Verdana" panose="020B0604030504040204" pitchFamily="34" charset="0"/>
-                  </a:rPr>
-                  <a:t> </a:t>
-                </a:r>
-                <a:r>
-                  <a:rPr lang="en-US" dirty="0" err="1">
-                    <a:solidFill>
-                      <a:schemeClr val="tx2"/>
-                    </a:solidFill>
-                    <a:latin typeface="Verdana" panose="020B0604030504040204" pitchFamily="34" charset="0"/>
-                    <a:ea typeface="Verdana" panose="020B0604030504040204" pitchFamily="34" charset="0"/>
-                  </a:rPr>
-                  <a:t>tiêu</a:t>
-                </a:r>
-                <a:endParaRPr lang="en-US" dirty="0">
-                  <a:solidFill>
-                    <a:schemeClr val="tx2"/>
-                  </a:solidFill>
-                  <a:latin typeface="Verdana" panose="020B0604030504040204" pitchFamily="34" charset="0"/>
-                  <a:ea typeface="Verdana" panose="020B0604030504040204" pitchFamily="34" charset="0"/>
-                </a:endParaRPr>
-              </a:p>
-              <a:p>
-                <a:pPr marL="742950" lvl="1" indent="-285750">
-                  <a:buFont typeface="Wingdings" panose="05000000000000000000" pitchFamily="2" charset="2"/>
-                  <a:buChar char="Ø"/>
-                </a:pPr>
-                <a:endParaRPr lang="en-US" dirty="0">
-                  <a:solidFill>
-                    <a:schemeClr val="tx2"/>
-                  </a:solidFill>
-                  <a:latin typeface="Verdana" panose="020B0604030504040204" pitchFamily="34" charset="0"/>
-                  <a:ea typeface="Verdana" panose="020B0604030504040204" pitchFamily="34" charset="0"/>
-                </a:endParaRPr>
-              </a:p>
-              <a:p>
-                <a:pPr marL="742950" lvl="1" indent="-285750">
-                  <a:buFont typeface="Wingdings" panose="05000000000000000000" pitchFamily="2" charset="2"/>
-                  <a:buChar char="Ø"/>
-                </a:pPr>
-                <a:endParaRPr lang="en-US" dirty="0">
-                  <a:solidFill>
-                    <a:schemeClr val="tx2"/>
-                  </a:solidFill>
-                  <a:latin typeface="Verdana" panose="020B0604030504040204" pitchFamily="34" charset="0"/>
-                  <a:ea typeface="Verdana" panose="020B0604030504040204" pitchFamily="34" charset="0"/>
-                </a:endParaRPr>
-              </a:p>
-              <a:p>
-                <a:pPr marL="742950" lvl="1" indent="-285750">
-                  <a:buFont typeface="Wingdings" panose="05000000000000000000" pitchFamily="2" charset="2"/>
-                  <a:buChar char="Ø"/>
-                </a:pPr>
-                <a:endParaRPr lang="en-US" dirty="0">
-                  <a:solidFill>
-                    <a:schemeClr val="tx2"/>
-                  </a:solidFill>
-                  <a:latin typeface="Verdana" panose="020B0604030504040204" pitchFamily="34" charset="0"/>
-                  <a:ea typeface="Verdana" panose="020B0604030504040204" pitchFamily="34" charset="0"/>
-                </a:endParaRPr>
-              </a:p>
-              <a:p>
-                <a:pPr marL="742950" lvl="1" indent="-285750">
-                  <a:buFont typeface="Wingdings" panose="05000000000000000000" pitchFamily="2" charset="2"/>
-                  <a:buChar char="Ø"/>
-                </a:pPr>
-                <a14:m>
-                  <m:oMath xmlns:m="http://schemas.openxmlformats.org/officeDocument/2006/math">
-                    <m:r>
-                      <a:rPr lang="en-US" b="0" i="1" smtClean="0">
-                        <a:solidFill>
-                          <a:schemeClr val="tx2"/>
-                        </a:solidFill>
-                        <a:latin typeface="Cambria Math" panose="02040503050406030204" pitchFamily="18" charset="0"/>
-                        <a:ea typeface="Verdana" panose="020B0604030504040204" pitchFamily="34" charset="0"/>
-                      </a:rPr>
-                      <m:t>𝑙</m:t>
-                    </m:r>
-                    <m:r>
-                      <a:rPr lang="en-US" b="0" i="1" smtClean="0">
-                        <a:solidFill>
-                          <a:schemeClr val="tx2"/>
-                        </a:solidFill>
-                        <a:latin typeface="Cambria Math" panose="02040503050406030204" pitchFamily="18" charset="0"/>
-                        <a:ea typeface="Verdana" panose="020B0604030504040204" pitchFamily="34" charset="0"/>
-                      </a:rPr>
-                      <m:t>:</m:t>
-                    </m:r>
-                  </m:oMath>
-                </a14:m>
-                <a:r>
-                  <a:rPr lang="en-US" dirty="0">
-                    <a:solidFill>
-                      <a:schemeClr val="tx2"/>
-                    </a:solidFill>
-                    <a:latin typeface="Verdana" panose="020B0604030504040204" pitchFamily="34" charset="0"/>
-                    <a:ea typeface="Verdana" panose="020B0604030504040204" pitchFamily="34" charset="0"/>
-                  </a:rPr>
-                  <a:t> Sai </a:t>
-                </a:r>
-                <a:r>
-                  <a:rPr lang="en-US" dirty="0" err="1">
-                    <a:solidFill>
-                      <a:schemeClr val="tx2"/>
-                    </a:solidFill>
-                    <a:latin typeface="Verdana" panose="020B0604030504040204" pitchFamily="34" charset="0"/>
-                    <a:ea typeface="Verdana" panose="020B0604030504040204" pitchFamily="34" charset="0"/>
-                  </a:rPr>
-                  <a:t>số</a:t>
-                </a:r>
-                <a:r>
-                  <a:rPr lang="en-US" dirty="0">
-                    <a:solidFill>
-                      <a:schemeClr val="tx2"/>
-                    </a:solidFill>
-                    <a:latin typeface="Verdana" panose="020B0604030504040204" pitchFamily="34" charset="0"/>
-                    <a:ea typeface="Verdana" panose="020B0604030504040204" pitchFamily="34" charset="0"/>
-                  </a:rPr>
-                  <a:t> </a:t>
-                </a:r>
-                <a:r>
-                  <a:rPr lang="en-US" dirty="0" err="1">
-                    <a:solidFill>
-                      <a:schemeClr val="tx2"/>
-                    </a:solidFill>
-                    <a:latin typeface="Verdana" panose="020B0604030504040204" pitchFamily="34" charset="0"/>
-                    <a:ea typeface="Verdana" panose="020B0604030504040204" pitchFamily="34" charset="0"/>
-                  </a:rPr>
-                  <a:t>tại</a:t>
-                </a:r>
-                <a:r>
-                  <a:rPr lang="en-US" dirty="0">
-                    <a:solidFill>
-                      <a:schemeClr val="tx2"/>
-                    </a:solidFill>
-                    <a:latin typeface="Verdana" panose="020B0604030504040204" pitchFamily="34" charset="0"/>
-                    <a:ea typeface="Verdana" panose="020B0604030504040204" pitchFamily="34" charset="0"/>
-                  </a:rPr>
-                  <a:t> </a:t>
-                </a:r>
-                <a:r>
-                  <a:rPr lang="en-US" dirty="0" err="1">
-                    <a:solidFill>
-                      <a:schemeClr val="tx2"/>
-                    </a:solidFill>
-                    <a:latin typeface="Verdana" panose="020B0604030504040204" pitchFamily="34" charset="0"/>
-                    <a:ea typeface="Verdana" panose="020B0604030504040204" pitchFamily="34" charset="0"/>
-                  </a:rPr>
-                  <a:t>các</a:t>
-                </a:r>
-                <a:r>
-                  <a:rPr lang="en-US" dirty="0">
-                    <a:solidFill>
-                      <a:schemeClr val="tx2"/>
-                    </a:solidFill>
-                    <a:latin typeface="Verdana" panose="020B0604030504040204" pitchFamily="34" charset="0"/>
-                    <a:ea typeface="Verdana" panose="020B0604030504040204" pitchFamily="34" charset="0"/>
-                  </a:rPr>
-                  <a:t> </a:t>
-                </a:r>
-                <a:r>
-                  <a:rPr lang="en-US" dirty="0" err="1">
-                    <a:solidFill>
-                      <a:schemeClr val="tx2"/>
-                    </a:solidFill>
-                    <a:latin typeface="Verdana" panose="020B0604030504040204" pitchFamily="34" charset="0"/>
-                    <a:ea typeface="Verdana" panose="020B0604030504040204" pitchFamily="34" charset="0"/>
-                  </a:rPr>
-                  <a:t>khoảng</a:t>
-                </a:r>
-                <a:r>
-                  <a:rPr lang="en-US" dirty="0">
-                    <a:solidFill>
-                      <a:schemeClr val="tx2"/>
-                    </a:solidFill>
-                    <a:latin typeface="Verdana" panose="020B0604030504040204" pitchFamily="34" charset="0"/>
-                    <a:ea typeface="Verdana" panose="020B0604030504040204" pitchFamily="34" charset="0"/>
-                  </a:rPr>
-                  <a:t> </a:t>
-                </a:r>
-                <a:r>
-                  <a:rPr lang="en-US" dirty="0" err="1">
-                    <a:solidFill>
-                      <a:schemeClr val="tx2"/>
-                    </a:solidFill>
-                    <a:latin typeface="Verdana" panose="020B0604030504040204" pitchFamily="34" charset="0"/>
-                    <a:ea typeface="Verdana" panose="020B0604030504040204" pitchFamily="34" charset="0"/>
-                  </a:rPr>
-                  <a:t>thời</a:t>
-                </a:r>
-                <a:r>
-                  <a:rPr lang="en-US" dirty="0">
-                    <a:solidFill>
-                      <a:schemeClr val="tx2"/>
-                    </a:solidFill>
-                    <a:latin typeface="Verdana" panose="020B0604030504040204" pitchFamily="34" charset="0"/>
-                    <a:ea typeface="Verdana" panose="020B0604030504040204" pitchFamily="34" charset="0"/>
-                  </a:rPr>
-                  <a:t> </a:t>
-                </a:r>
-                <a:r>
-                  <a:rPr lang="en-US" dirty="0" err="1">
-                    <a:solidFill>
-                      <a:schemeClr val="tx2"/>
-                    </a:solidFill>
-                    <a:latin typeface="Verdana" panose="020B0604030504040204" pitchFamily="34" charset="0"/>
-                    <a:ea typeface="Verdana" panose="020B0604030504040204" pitchFamily="34" charset="0"/>
-                  </a:rPr>
-                  <a:t>gian</a:t>
-                </a:r>
-                <a:r>
-                  <a:rPr lang="en-US" dirty="0">
-                    <a:solidFill>
-                      <a:schemeClr val="tx2"/>
-                    </a:solidFill>
-                    <a:latin typeface="Verdana" panose="020B0604030504040204" pitchFamily="34" charset="0"/>
-                    <a:ea typeface="Verdana" panose="020B0604030504040204" pitchFamily="34" charset="0"/>
-                  </a:rPr>
-                  <a:t> </a:t>
-                </a:r>
-              </a:p>
-            </p:txBody>
-          </p:sp>
-        </mc:Choice>
-        <mc:Fallback xmlns="">
-          <p:sp>
-            <p:nvSpPr>
-              <p:cNvPr id="9" name="TextBox 8">
-                <a:extLst>
-                  <a:ext uri="{FF2B5EF4-FFF2-40B4-BE49-F238E27FC236}">
-                    <a16:creationId xmlns:a16="http://schemas.microsoft.com/office/drawing/2014/main" id="{94226255-64FE-A5E6-6464-5D6B780E2C15}"/>
-                  </a:ext>
-                </a:extLst>
-              </p:cNvPr>
-              <p:cNvSpPr txBox="1">
-                <a:spLocks noRot="1" noChangeAspect="1" noMove="1" noResize="1" noEditPoints="1" noAdjustHandles="1" noChangeArrowheads="1" noChangeShapeType="1" noTextEdit="1"/>
-              </p:cNvSpPr>
-              <p:nvPr/>
-            </p:nvSpPr>
-            <p:spPr>
-              <a:xfrm>
-                <a:off x="1244599" y="2253343"/>
-                <a:ext cx="5156201" cy="2330574"/>
-              </a:xfrm>
-              <a:prstGeom prst="rect">
-                <a:avLst/>
-              </a:prstGeom>
-              <a:blipFill>
-                <a:blip r:embed="rId4"/>
-                <a:stretch>
-                  <a:fillRect l="-709" t="-1571" b="-3141"/>
-                </a:stretch>
-              </a:blipFill>
-            </p:spPr>
-            <p:txBody>
-              <a:bodyPr/>
-              <a:lstStyle/>
-              <a:p>
-                <a:r>
-                  <a:rPr lang="en-US">
-                    <a:noFill/>
-                  </a:rPr>
-                  <a:t> </a:t>
-                </a:r>
-              </a:p>
-            </p:txBody>
-          </p:sp>
-        </mc:Fallback>
-      </mc:AlternateContent>
-      <mc:AlternateContent xmlns:mc="http://schemas.openxmlformats.org/markup-compatibility/2006">
-        <mc:Choice xmlns:a14="http://schemas.microsoft.com/office/drawing/2010/main" Requires="a14">
           <p:sp>
             <p:nvSpPr>
               <p:cNvPr id="3" name="Rectangle 2">
@@ -22963,6 +22530,7 @@
               </a:bodyPr>
               <a:lstStyle/>
               <a:p>
+                <a:pPr/>
                 <a14:m>
                   <m:oMathPara xmlns:m="http://schemas.openxmlformats.org/officeDocument/2006/math">
                     <m:oMathParaPr>
@@ -22972,7 +22540,7 @@
                       <m:func>
                         <m:funcPr>
                           <m:ctrlPr>
-                            <a:rPr lang="en-US" smtClean="0">
+                            <a:rPr lang="en-US" i="1" smtClean="0">
                               <a:latin typeface="Cambria Math" panose="02040503050406030204" pitchFamily="18" charset="0"/>
                             </a:rPr>
                           </m:ctrlPr>
@@ -22981,7 +22549,7 @@
                           <m:limLow>
                             <m:limLowPr>
                               <m:ctrlPr>
-                                <a:rPr lang="en-US">
+                                <a:rPr lang="en-US" i="1">
                                   <a:latin typeface="Cambria Math" panose="02040503050406030204" pitchFamily="18" charset="0"/>
                                 </a:rPr>
                               </m:ctrlPr>
@@ -23132,7 +22700,7 @@
             </p:txBody>
           </p:sp>
         </mc:Choice>
-        <mc:Fallback>
+        <mc:Fallback xmlns="">
           <p:sp>
             <p:nvSpPr>
               <p:cNvPr id="3" name="Rectangle 2">
@@ -23177,8 +22745,8 @@
           </p:sp>
         </mc:Fallback>
       </mc:AlternateContent>
-      <mc:AlternateContent xmlns:mc="http://schemas.openxmlformats.org/markup-compatibility/2006">
-        <mc:Choice xmlns:a14="http://schemas.microsoft.com/office/drawing/2010/main" Requires="a14">
+      <mc:AlternateContent xmlns:mc="http://schemas.openxmlformats.org/markup-compatibility/2006" xmlns:a14="http://schemas.microsoft.com/office/drawing/2010/main">
+        <mc:Choice Requires="a14">
           <p:sp>
             <p:nvSpPr>
               <p:cNvPr id="7" name="Rectangle 6">
@@ -23206,6 +22774,7 @@
               </a:bodyPr>
               <a:lstStyle/>
               <a:p>
+                <a:pPr/>
                 <a14:m>
                   <m:oMathPara xmlns:m="http://schemas.openxmlformats.org/officeDocument/2006/math">
                     <m:oMathParaPr>
@@ -23216,7 +22785,7 @@
                         <m:accPr>
                           <m:chr m:val="̇"/>
                           <m:ctrlPr>
-                            <a:rPr lang="en-US">
+                            <a:rPr lang="en-US" i="1">
                               <a:latin typeface="Cambria Math" panose="02040503050406030204" pitchFamily="18" charset="0"/>
                             </a:rPr>
                           </m:ctrlPr>
@@ -23330,7 +22899,7 @@
             </p:txBody>
           </p:sp>
         </mc:Choice>
-        <mc:Fallback>
+        <mc:Fallback xmlns="">
           <p:sp>
             <p:nvSpPr>
               <p:cNvPr id="7" name="Rectangle 6">
@@ -23784,8 +23353,8 @@
         </p:blipFill>
         <p:spPr>
           <a:xfrm>
-            <a:off x="4427537" y="1809470"/>
-            <a:ext cx="3336925" cy="1727835"/>
+            <a:off x="2719262" y="1648110"/>
+            <a:ext cx="6753474" cy="3435846"/>
           </a:xfrm>
           <a:prstGeom prst="rect">
             <a:avLst/>
@@ -23808,7 +23377,7 @@
             </p:nvSpPr>
             <p:spPr>
               <a:xfrm>
-                <a:off x="1371600" y="3537305"/>
+                <a:off x="1371600" y="5154420"/>
                 <a:ext cx="6784082" cy="1077218"/>
               </a:xfrm>
               <a:prstGeom prst="rect">
@@ -24254,7 +23823,7 @@
             </p:nvSpPr>
             <p:spPr>
               <a:xfrm>
-                <a:off x="1371600" y="3537305"/>
+                <a:off x="1371600" y="5154420"/>
                 <a:ext cx="6784082" cy="1077218"/>
               </a:xfrm>
               <a:prstGeom prst="rect">
@@ -24263,7 +23832,7 @@
               <a:blipFill>
                 <a:blip r:embed="rId3"/>
                 <a:stretch>
-                  <a:fillRect l="-719" t="-2825" b="-7910"/>
+                  <a:fillRect l="-719" t="-3409" b="-8523"/>
                 </a:stretch>
               </a:blipFill>
             </p:spPr>
@@ -24296,8 +23865,8 @@
         </p:nvSpPr>
         <p:spPr>
           <a:xfrm>
-            <a:off x="5841093" y="1899981"/>
-            <a:ext cx="324263" cy="191641"/>
+            <a:off x="5678961" y="1881832"/>
+            <a:ext cx="417039" cy="286043"/>
           </a:xfrm>
           <a:prstGeom prst="rect">
             <a:avLst/>
@@ -24347,8 +23916,8 @@
             </p:nvSpPr>
             <p:spPr>
               <a:xfrm>
-                <a:off x="5681133" y="1847850"/>
-                <a:ext cx="670984" cy="246221"/>
+                <a:off x="5208491" y="1844788"/>
+                <a:ext cx="1357978" cy="338554"/>
               </a:xfrm>
               <a:prstGeom prst="rect">
                 <a:avLst/>
@@ -24361,6 +23930,7 @@
               </a:bodyPr>
               <a:lstStyle/>
               <a:p>
+                <a:pPr/>
                 <a14:m>
                   <m:oMathPara xmlns:m="http://schemas.openxmlformats.org/officeDocument/2006/math">
                     <m:oMathParaPr>
@@ -24370,14 +23940,14 @@
                       <m:sSub>
                         <m:sSubPr>
                           <m:ctrlPr>
-                            <a:rPr lang="en-US" sz="1000" b="0" i="1" smtClean="0">
+                            <a:rPr lang="en-US" sz="1600" b="0" i="1" smtClean="0">
                               <a:latin typeface="Cambria Math" panose="02040503050406030204" pitchFamily="18" charset="0"/>
                             </a:rPr>
                           </m:ctrlPr>
                         </m:sSubPr>
                         <m:e>
                           <m:r>
-                            <a:rPr lang="en-US" sz="1000" b="0" i="1" smtClean="0">
+                            <a:rPr lang="en-US" sz="1600" b="0" i="1" smtClean="0">
                               <a:latin typeface="Cambria Math" panose="02040503050406030204" pitchFamily="18" charset="0"/>
                             </a:rPr>
                             <m:t>𝑥</m:t>
@@ -24385,7 +23955,7 @@
                         </m:e>
                         <m:sub>
                           <m:r>
-                            <a:rPr lang="en-US" sz="1000" b="0" i="1" smtClean="0">
+                            <a:rPr lang="en-US" sz="1600" b="0" i="1" smtClean="0">
                               <a:latin typeface="Cambria Math" panose="02040503050406030204" pitchFamily="18" charset="0"/>
                             </a:rPr>
                             <m:t>𝑜𝑏𝑠</m:t>
@@ -24395,7 +23965,7 @@
                     </m:oMath>
                   </m:oMathPara>
                 </a14:m>
-                <a:endParaRPr lang="en-US" sz="1000" dirty="0"/>
+                <a:endParaRPr lang="en-US" sz="1600" dirty="0"/>
               </a:p>
             </p:txBody>
           </p:sp>
@@ -24417,8 +23987,8 @@
             </p:nvSpPr>
             <p:spPr>
               <a:xfrm>
-                <a:off x="5681133" y="1847850"/>
-                <a:ext cx="670984" cy="246221"/>
+                <a:off x="5208491" y="1844788"/>
+                <a:ext cx="1357978" cy="338554"/>
               </a:xfrm>
               <a:prstGeom prst="rect">
                 <a:avLst/>

</xml_diff>